<commit_message>
Updates presentation with new DNN processing graph
</commit_message>
<xml_diff>
--- a/Big AI - Applying Artificial Intelligence at Scale/Deep Learning at Scale/Hands-On With Azure Batch.pptx
+++ b/Big AI - Applying Artificial Intelligence at Scale/Deep Learning at Scale/Hands-On With Azure Batch.pptx
@@ -6,7 +6,7 @@
     <p:sldMasterId id="2147483679" r:id="rId2"/>
   </p:sldMasterIdLst>
   <p:notesMasterIdLst>
-    <p:notesMasterId r:id="rId20"/>
+    <p:notesMasterId r:id="rId21"/>
   </p:notesMasterIdLst>
   <p:sldIdLst>
     <p:sldId id="263" r:id="rId3"/>
@@ -21,11 +21,12 @@
     <p:sldId id="272" r:id="rId12"/>
     <p:sldId id="274" r:id="rId13"/>
     <p:sldId id="282" r:id="rId14"/>
-    <p:sldId id="275" r:id="rId15"/>
+    <p:sldId id="283" r:id="rId15"/>
     <p:sldId id="280" r:id="rId16"/>
     <p:sldId id="276" r:id="rId17"/>
     <p:sldId id="277" r:id="rId18"/>
     <p:sldId id="278" r:id="rId19"/>
+    <p:sldId id="275" r:id="rId20"/>
   </p:sldIdLst>
   <p:sldSz cx="12192000" cy="6858000"/>
   <p:notesSz cx="6858000" cy="9144000"/>
@@ -218,7 +219,7 @@
           <a:p>
             <a:fld id="{CD3AC266-FF50-4AE8-8525-AEEB6326BD7F}" type="datetimeFigureOut">
               <a:rPr lang="en-US" smtClean="0"/>
-              <a:t>5/8/2017</a:t>
+              <a:t>5/9/2017</a:t>
             </a:fld>
             <a:endParaRPr lang="en-US"/>
           </a:p>
@@ -725,7 +726,7 @@
                 <a:tabLst/>
                 <a:defRPr/>
               </a:pPr>
-              <a:t>5/8/2017 10:51 PM</a:t>
+              <a:t>5/9/2017 3:47 PM</a:t>
             </a:fld>
             <a:endParaRPr kumimoji="0" lang="en-US" sz="1800" b="0" i="0" u="none" strike="noStrike" kern="0" cap="none" spc="0" normalizeH="0" baseline="0" noProof="0" dirty="0">
               <a:ln>
@@ -1157,7 +1158,7 @@
     </p:spTree>
     <p:extLst>
       <p:ext uri="{BB962C8B-B14F-4D97-AF65-F5344CB8AC3E}">
-        <p14:creationId xmlns:p14="http://schemas.microsoft.com/office/powerpoint/2010/main" val="27526812"/>
+        <p14:creationId xmlns:p14="http://schemas.microsoft.com/office/powerpoint/2010/main" val="2687597506"/>
       </p:ext>
     </p:extLst>
   </p:cSld>
@@ -1392,7 +1393,7 @@
           <a:p>
             <a:fld id="{0F1DD190-47F2-4EC2-A20D-7847072E60CD}" type="datetime8">
               <a:rPr lang="en-US" smtClean="0"/>
-              <a:t>5/8/2017 10:51 PM</a:t>
+              <a:t>5/9/2017 3:47 PM</a:t>
             </a:fld>
             <a:endParaRPr lang="en-US" dirty="0"/>
           </a:p>
@@ -1629,7 +1630,7 @@
                   <a:prstClr val="black"/>
                 </a:solidFill>
               </a:rPr>
-              <a:t>5/8/2017 10:51 PM</a:t>
+              <a:t>5/9/2017 3:47 PM</a:t>
             </a:fld>
             <a:endParaRPr lang="en-US" dirty="0">
               <a:solidFill>
@@ -1713,6 +1714,90 @@
     <p:extLst>
       <p:ext uri="{BB962C8B-B14F-4D97-AF65-F5344CB8AC3E}">
         <p14:creationId xmlns:p14="http://schemas.microsoft.com/office/powerpoint/2010/main" val="144166033"/>
+      </p:ext>
+    </p:extLst>
+  </p:cSld>
+  <p:clrMapOvr>
+    <a:masterClrMapping/>
+  </p:clrMapOvr>
+</p:notes>
+</file>
+
+<file path=ppt/notesSlides/notesSlide18.xml><?xml version="1.0" encoding="utf-8"?>
+<p:notes xmlns:a="http://schemas.openxmlformats.org/drawingml/2006/main" xmlns:r="http://schemas.openxmlformats.org/officeDocument/2006/relationships" xmlns:p="http://schemas.openxmlformats.org/presentationml/2006/main">
+  <p:cSld>
+    <p:spTree>
+      <p:nvGrpSpPr>
+        <p:cNvPr id="1" name=""/>
+        <p:cNvGrpSpPr/>
+        <p:nvPr/>
+      </p:nvGrpSpPr>
+      <p:grpSpPr>
+        <a:xfrm>
+          <a:off x="0" y="0"/>
+          <a:ext cx="0" cy="0"/>
+          <a:chOff x="0" y="0"/>
+          <a:chExt cx="0" cy="0"/>
+        </a:xfrm>
+      </p:grpSpPr>
+      <p:sp>
+        <p:nvSpPr>
+          <p:cNvPr id="2" name="Slide Image Placeholder 1"/>
+          <p:cNvSpPr>
+            <a:spLocks noGrp="1" noRot="1" noChangeAspect="1"/>
+          </p:cNvSpPr>
+          <p:nvPr>
+            <p:ph type="sldImg"/>
+          </p:nvPr>
+        </p:nvSpPr>
+        <p:spPr/>
+      </p:sp>
+      <p:sp>
+        <p:nvSpPr>
+          <p:cNvPr id="3" name="Notes Placeholder 2"/>
+          <p:cNvSpPr>
+            <a:spLocks noGrp="1"/>
+          </p:cNvSpPr>
+          <p:nvPr>
+            <p:ph type="body" idx="1"/>
+          </p:nvPr>
+        </p:nvSpPr>
+        <p:spPr/>
+        <p:txBody>
+          <a:bodyPr/>
+          <a:lstStyle/>
+          <a:p>
+            <a:endParaRPr lang="en-GB"/>
+          </a:p>
+        </p:txBody>
+      </p:sp>
+      <p:sp>
+        <p:nvSpPr>
+          <p:cNvPr id="4" name="Slide Number Placeholder 3"/>
+          <p:cNvSpPr>
+            <a:spLocks noGrp="1"/>
+          </p:cNvSpPr>
+          <p:nvPr>
+            <p:ph type="sldNum" sz="quarter" idx="10"/>
+          </p:nvPr>
+        </p:nvSpPr>
+        <p:spPr/>
+        <p:txBody>
+          <a:bodyPr/>
+          <a:lstStyle/>
+          <a:p>
+            <a:fld id="{4165D95B-184A-46ED-A5C4-612AE4324830}" type="slidenum">
+              <a:rPr lang="en-GB" smtClean="0"/>
+              <a:t>18</a:t>
+            </a:fld>
+            <a:endParaRPr lang="en-GB"/>
+          </a:p>
+        </p:txBody>
+      </p:sp>
+    </p:spTree>
+    <p:extLst>
+      <p:ext uri="{BB962C8B-B14F-4D97-AF65-F5344CB8AC3E}">
+        <p14:creationId xmlns:p14="http://schemas.microsoft.com/office/powerpoint/2010/main" val="27526812"/>
       </p:ext>
     </p:extLst>
   </p:cSld>
@@ -2126,7 +2211,7 @@
           <a:p>
             <a:fld id="{EA2B2ED8-C573-45EF-BF68-CEC19505703A}" type="datetime8">
               <a:rPr lang="en-US" smtClean="0"/>
-              <a:t>5/8/2017 10:51 PM</a:t>
+              <a:t>5/9/2017 3:47 PM</a:t>
             </a:fld>
             <a:endParaRPr lang="en-US" dirty="0"/>
           </a:p>
@@ -2462,7 +2547,7 @@
           <a:p>
             <a:fld id="{0F1DD190-47F2-4EC2-A20D-7847072E60CD}" type="datetime8">
               <a:rPr lang="en-US" smtClean="0"/>
-              <a:t>5/8/2017 10:51 PM</a:t>
+              <a:t>5/9/2017 3:47 PM</a:t>
             </a:fld>
             <a:endParaRPr lang="en-US" dirty="0"/>
           </a:p>
@@ -2730,7 +2815,7 @@
           <a:p>
             <a:fld id="{0F1DD190-47F2-4EC2-A20D-7847072E60CD}" type="datetime8">
               <a:rPr lang="en-US" smtClean="0"/>
-              <a:t>5/8/2017 10:51 PM</a:t>
+              <a:t>5/9/2017 3:47 PM</a:t>
             </a:fld>
             <a:endParaRPr lang="en-US" dirty="0"/>
           </a:p>
@@ -17226,15 +17311,7 @@
                 <a:lumOff val="75000"/>
               </a:schemeClr>
             </a:solidFill>
-            <a:extLst>
-              <a:ext uri="{909E8E84-426E-40DD-AFC4-6F175D3DCCD1}">
-                <a14:hiddenFill xmlns:a14="http://schemas.microsoft.com/office/drawing/2010/main">
-                  <a:solidFill>
-                    <a:srgbClr val="FFFFFF"/>
-                  </a:solidFill>
-                </a14:hiddenFill>
-              </a:ext>
-            </a:extLst>
+            <a:extLst/>
           </p:spPr>
         </p:pic>
         <p:pic>
@@ -17278,15 +17355,7 @@
                 <a:lumOff val="75000"/>
               </a:schemeClr>
             </a:solidFill>
-            <a:extLst>
-              <a:ext uri="{909E8E84-426E-40DD-AFC4-6F175D3DCCD1}">
-                <a14:hiddenFill xmlns:a14="http://schemas.microsoft.com/office/drawing/2010/main">
-                  <a:solidFill>
-                    <a:srgbClr val="FFFFFF"/>
-                  </a:solidFill>
-                </a14:hiddenFill>
-              </a:ext>
-            </a:extLst>
+            <a:extLst/>
           </p:spPr>
         </p:pic>
         <p:pic>
@@ -17330,15 +17399,7 @@
                 <a:lumOff val="75000"/>
               </a:schemeClr>
             </a:solidFill>
-            <a:extLst>
-              <a:ext uri="{909E8E84-426E-40DD-AFC4-6F175D3DCCD1}">
-                <a14:hiddenFill xmlns:a14="http://schemas.microsoft.com/office/drawing/2010/main">
-                  <a:solidFill>
-                    <a:srgbClr val="FFFFFF"/>
-                  </a:solidFill>
-                </a14:hiddenFill>
-              </a:ext>
-            </a:extLst>
+            <a:extLst/>
           </p:spPr>
         </p:pic>
         <p:pic>
@@ -17382,15 +17443,7 @@
                 <a:lumOff val="75000"/>
               </a:schemeClr>
             </a:solidFill>
-            <a:extLst>
-              <a:ext uri="{909E8E84-426E-40DD-AFC4-6F175D3DCCD1}">
-                <a14:hiddenFill xmlns:a14="http://schemas.microsoft.com/office/drawing/2010/main">
-                  <a:solidFill>
-                    <a:srgbClr val="FFFFFF"/>
-                  </a:solidFill>
-                </a14:hiddenFill>
-              </a:ext>
-            </a:extLst>
+            <a:extLst/>
           </p:spPr>
         </p:pic>
       </p:grpSp>
@@ -18716,15 +18769,7 @@
               <a:avLst/>
             </a:prstGeom>
             <a:grpFill/>
-            <a:extLst>
-              <a:ext uri="{909E8E84-426E-40DD-AFC4-6F175D3DCCD1}">
-                <a14:hiddenFill xmlns:a14="http://schemas.microsoft.com/office/drawing/2010/main">
-                  <a:solidFill>
-                    <a:srgbClr val="FFFFFF"/>
-                  </a:solidFill>
-                </a14:hiddenFill>
-              </a:ext>
-            </a:extLst>
+            <a:extLst/>
           </p:spPr>
         </p:pic>
       </p:grpSp>
@@ -20046,6 +20091,3687 @@
 </file>
 
 <file path=ppt/slides/slide13.xml><?xml version="1.0" encoding="utf-8"?>
+<p:sld xmlns:a="http://schemas.openxmlformats.org/drawingml/2006/main" xmlns:r="http://schemas.openxmlformats.org/officeDocument/2006/relationships" xmlns:p="http://schemas.openxmlformats.org/presentationml/2006/main">
+  <p:cSld>
+    <p:spTree>
+      <p:nvGrpSpPr>
+        <p:cNvPr id="1" name=""/>
+        <p:cNvGrpSpPr/>
+        <p:nvPr/>
+      </p:nvGrpSpPr>
+      <p:grpSpPr>
+        <a:xfrm>
+          <a:off x="0" y="0"/>
+          <a:ext cx="0" cy="0"/>
+          <a:chOff x="0" y="0"/>
+          <a:chExt cx="0" cy="0"/>
+        </a:xfrm>
+      </p:grpSpPr>
+      <p:sp>
+        <p:nvSpPr>
+          <p:cNvPr id="22" name="Content Placeholder 21"/>
+          <p:cNvSpPr>
+            <a:spLocks noGrp="1"/>
+          </p:cNvSpPr>
+          <p:nvPr>
+            <p:ph type="body" sz="quarter" idx="10"/>
+          </p:nvPr>
+        </p:nvSpPr>
+        <p:spPr>
+          <a:xfrm>
+            <a:off x="128347" y="1402090"/>
+            <a:ext cx="7403600" cy="5455910"/>
+          </a:xfrm>
+        </p:spPr>
+        <p:txBody>
+          <a:bodyPr>
+            <a:normAutofit/>
+          </a:bodyPr>
+          <a:lstStyle/>
+          <a:p>
+            <a:pPr marL="514350" indent="-514350">
+              <a:buFont typeface="+mj-lt"/>
+              <a:buAutoNum type="arabicPeriod"/>
+            </a:pPr>
+            <a:r>
+              <a:rPr lang="en-US" sz="2400" dirty="0"/>
+              <a:t>Create a DNN training script with any chosen tool</a:t>
+            </a:r>
+          </a:p>
+          <a:p>
+            <a:pPr marL="514350" indent="-514350">
+              <a:buFont typeface="+mj-lt"/>
+              <a:buAutoNum type="arabicPeriod"/>
+            </a:pPr>
+            <a:r>
+              <a:rPr lang="en-US" sz="2400" dirty="0"/>
+              <a:t>Package the DNN as a Docker image and upload it to the Azure Container Registry</a:t>
+            </a:r>
+          </a:p>
+          <a:p>
+            <a:pPr marL="514350" indent="-514350">
+              <a:buFont typeface="+mj-lt"/>
+              <a:buAutoNum type="arabicPeriod"/>
+            </a:pPr>
+            <a:r>
+              <a:rPr lang="en-US" sz="2400" dirty="0"/>
+              <a:t>Create a pool with GPU VMs</a:t>
+            </a:r>
+          </a:p>
+          <a:p>
+            <a:pPr marL="514350" indent="-514350">
+              <a:buFont typeface="+mj-lt"/>
+              <a:buAutoNum type="arabicPeriod"/>
+            </a:pPr>
+            <a:r>
+              <a:rPr lang="en-US" sz="2400" dirty="0"/>
+              <a:t>Schedule job for parameters sweep training tasks on the pool</a:t>
+            </a:r>
+          </a:p>
+          <a:p>
+            <a:pPr marL="514350" indent="-514350">
+              <a:buFont typeface="+mj-lt"/>
+              <a:buAutoNum type="arabicPeriod"/>
+            </a:pPr>
+            <a:r>
+              <a:rPr lang="en-US" sz="2400" dirty="0"/>
+              <a:t>Tasks are allocated to the pool and the Docker image is downloaded if required</a:t>
+            </a:r>
+          </a:p>
+          <a:p>
+            <a:pPr marL="514350" indent="-514350">
+              <a:buFont typeface="+mj-lt"/>
+              <a:buAutoNum type="arabicPeriod"/>
+            </a:pPr>
+            <a:r>
+              <a:rPr lang="en-US" sz="2400" dirty="0"/>
+              <a:t>Data is copied to the container</a:t>
+            </a:r>
+          </a:p>
+          <a:p>
+            <a:pPr marL="514350" indent="-514350">
+              <a:buFont typeface="+mj-lt"/>
+              <a:buAutoNum type="arabicPeriod"/>
+            </a:pPr>
+            <a:r>
+              <a:rPr lang="en-US" sz="2400" dirty="0"/>
+              <a:t>Tasks as containers perform the DNN training</a:t>
+            </a:r>
+          </a:p>
+          <a:p>
+            <a:pPr marL="514350" indent="-514350">
+              <a:buFont typeface="+mj-lt"/>
+              <a:buAutoNum type="arabicPeriod"/>
+            </a:pPr>
+            <a:r>
+              <a:rPr lang="en-US" sz="2400" dirty="0"/>
+              <a:t>Tasks write results and trained models to storage</a:t>
+            </a:r>
+            <a:endParaRPr lang="en-GB" sz="2400" dirty="0"/>
+          </a:p>
+        </p:txBody>
+      </p:sp>
+      <p:pic>
+        <p:nvPicPr>
+          <p:cNvPr id="24" name="Picture 23"/>
+          <p:cNvPicPr>
+            <a:picLocks noChangeAspect="1"/>
+          </p:cNvPicPr>
+          <p:nvPr/>
+        </p:nvPicPr>
+        <p:blipFill>
+          <a:blip r:embed="rId3"/>
+          <a:stretch>
+            <a:fillRect/>
+          </a:stretch>
+        </p:blipFill>
+        <p:spPr>
+          <a:xfrm>
+            <a:off x="7338255" y="2845767"/>
+            <a:ext cx="887527" cy="1036945"/>
+          </a:xfrm>
+          <a:prstGeom prst="rect">
+            <a:avLst/>
+          </a:prstGeom>
+        </p:spPr>
+      </p:pic>
+      <p:pic>
+        <p:nvPicPr>
+          <p:cNvPr id="23" name="Picture 22"/>
+          <p:cNvPicPr>
+            <a:picLocks noChangeAspect="1"/>
+          </p:cNvPicPr>
+          <p:nvPr/>
+        </p:nvPicPr>
+        <p:blipFill>
+          <a:blip r:embed="rId4"/>
+          <a:stretch>
+            <a:fillRect/>
+          </a:stretch>
+        </p:blipFill>
+        <p:spPr>
+          <a:xfrm>
+            <a:off x="8608858" y="2271493"/>
+            <a:ext cx="1012429" cy="951150"/>
+          </a:xfrm>
+          <a:prstGeom prst="rect">
+            <a:avLst/>
+          </a:prstGeom>
+        </p:spPr>
+      </p:pic>
+      <p:pic>
+        <p:nvPicPr>
+          <p:cNvPr id="25" name="Picture 24"/>
+          <p:cNvPicPr>
+            <a:picLocks noChangeAspect="1"/>
+          </p:cNvPicPr>
+          <p:nvPr/>
+        </p:nvPicPr>
+        <p:blipFill>
+          <a:blip r:embed="rId5"/>
+          <a:stretch>
+            <a:fillRect/>
+          </a:stretch>
+        </p:blipFill>
+        <p:spPr>
+          <a:xfrm>
+            <a:off x="10254794" y="2603590"/>
+            <a:ext cx="652417" cy="608250"/>
+          </a:xfrm>
+          <a:prstGeom prst="rect">
+            <a:avLst/>
+          </a:prstGeom>
+        </p:spPr>
+      </p:pic>
+      <p:pic>
+        <p:nvPicPr>
+          <p:cNvPr id="27" name="Picture 26"/>
+          <p:cNvPicPr>
+            <a:picLocks noChangeAspect="1"/>
+          </p:cNvPicPr>
+          <p:nvPr/>
+        </p:nvPicPr>
+        <p:blipFill>
+          <a:blip r:embed="rId5"/>
+          <a:stretch>
+            <a:fillRect/>
+          </a:stretch>
+        </p:blipFill>
+        <p:spPr>
+          <a:xfrm>
+            <a:off x="10407194" y="2755990"/>
+            <a:ext cx="652417" cy="608250"/>
+          </a:xfrm>
+          <a:prstGeom prst="rect">
+            <a:avLst/>
+          </a:prstGeom>
+        </p:spPr>
+      </p:pic>
+      <p:pic>
+        <p:nvPicPr>
+          <p:cNvPr id="28" name="Picture 27"/>
+          <p:cNvPicPr>
+            <a:picLocks noChangeAspect="1"/>
+          </p:cNvPicPr>
+          <p:nvPr/>
+        </p:nvPicPr>
+        <p:blipFill>
+          <a:blip r:embed="rId5"/>
+          <a:stretch>
+            <a:fillRect/>
+          </a:stretch>
+        </p:blipFill>
+        <p:spPr>
+          <a:xfrm>
+            <a:off x="10559594" y="2908390"/>
+            <a:ext cx="652417" cy="608250"/>
+          </a:xfrm>
+          <a:prstGeom prst="rect">
+            <a:avLst/>
+          </a:prstGeom>
+        </p:spPr>
+      </p:pic>
+      <p:pic>
+        <p:nvPicPr>
+          <p:cNvPr id="29" name="Picture 28"/>
+          <p:cNvPicPr>
+            <a:picLocks noChangeAspect="1"/>
+          </p:cNvPicPr>
+          <p:nvPr/>
+        </p:nvPicPr>
+        <p:blipFill>
+          <a:blip r:embed="rId5"/>
+          <a:stretch>
+            <a:fillRect/>
+          </a:stretch>
+        </p:blipFill>
+        <p:spPr>
+          <a:xfrm>
+            <a:off x="10711994" y="3060790"/>
+            <a:ext cx="652417" cy="608250"/>
+          </a:xfrm>
+          <a:prstGeom prst="rect">
+            <a:avLst/>
+          </a:prstGeom>
+        </p:spPr>
+      </p:pic>
+      <p:pic>
+        <p:nvPicPr>
+          <p:cNvPr id="30" name="Picture 29"/>
+          <p:cNvPicPr>
+            <a:picLocks noChangeAspect="1"/>
+          </p:cNvPicPr>
+          <p:nvPr/>
+        </p:nvPicPr>
+        <p:blipFill>
+          <a:blip r:embed="rId5"/>
+          <a:stretch>
+            <a:fillRect/>
+          </a:stretch>
+        </p:blipFill>
+        <p:spPr>
+          <a:xfrm>
+            <a:off x="10864394" y="3213190"/>
+            <a:ext cx="652417" cy="608250"/>
+          </a:xfrm>
+          <a:prstGeom prst="rect">
+            <a:avLst/>
+          </a:prstGeom>
+        </p:spPr>
+      </p:pic>
+      <p:pic>
+        <p:nvPicPr>
+          <p:cNvPr id="31" name="Picture 30"/>
+          <p:cNvPicPr>
+            <a:picLocks noChangeAspect="1"/>
+          </p:cNvPicPr>
+          <p:nvPr/>
+        </p:nvPicPr>
+        <p:blipFill>
+          <a:blip r:embed="rId5"/>
+          <a:stretch>
+            <a:fillRect/>
+          </a:stretch>
+        </p:blipFill>
+        <p:spPr>
+          <a:xfrm>
+            <a:off x="11016794" y="3365590"/>
+            <a:ext cx="652417" cy="608250"/>
+          </a:xfrm>
+          <a:prstGeom prst="rect">
+            <a:avLst/>
+          </a:prstGeom>
+        </p:spPr>
+      </p:pic>
+      <p:pic>
+        <p:nvPicPr>
+          <p:cNvPr id="32" name="Picture 31"/>
+          <p:cNvPicPr>
+            <a:picLocks noChangeAspect="1"/>
+          </p:cNvPicPr>
+          <p:nvPr/>
+        </p:nvPicPr>
+        <p:blipFill>
+          <a:blip r:embed="rId5"/>
+          <a:stretch>
+            <a:fillRect/>
+          </a:stretch>
+        </p:blipFill>
+        <p:spPr>
+          <a:xfrm>
+            <a:off x="11169194" y="3517990"/>
+            <a:ext cx="652417" cy="608250"/>
+          </a:xfrm>
+          <a:prstGeom prst="rect">
+            <a:avLst/>
+          </a:prstGeom>
+        </p:spPr>
+      </p:pic>
+      <p:pic>
+        <p:nvPicPr>
+          <p:cNvPr id="34" name="Picture 33"/>
+          <p:cNvPicPr>
+            <a:picLocks noChangeAspect="1"/>
+          </p:cNvPicPr>
+          <p:nvPr/>
+        </p:nvPicPr>
+        <p:blipFill>
+          <a:blip r:embed="rId6" cstate="print">
+            <a:extLst>
+              <a:ext uri="{28A0092B-C50C-407E-A947-70E740481C1C}">
+                <a14:useLocalDpi xmlns:a14="http://schemas.microsoft.com/office/drawing/2010/main" val="0"/>
+              </a:ext>
+            </a:extLst>
+          </a:blip>
+          <a:stretch>
+            <a:fillRect/>
+          </a:stretch>
+        </p:blipFill>
+        <p:spPr>
+          <a:xfrm>
+            <a:off x="8668930" y="1825625"/>
+            <a:ext cx="536524" cy="461232"/>
+          </a:xfrm>
+          <a:prstGeom prst="rect">
+            <a:avLst/>
+          </a:prstGeom>
+          <a:ln>
+            <a:noFill/>
+          </a:ln>
+        </p:spPr>
+        <p:style>
+          <a:lnRef idx="2">
+            <a:schemeClr val="accent5"/>
+          </a:lnRef>
+          <a:fillRef idx="1">
+            <a:schemeClr val="lt1"/>
+          </a:fillRef>
+          <a:effectRef idx="0">
+            <a:schemeClr val="accent5"/>
+          </a:effectRef>
+          <a:fontRef idx="minor">
+            <a:schemeClr val="dk1"/>
+          </a:fontRef>
+        </p:style>
+      </p:pic>
+      <p:pic>
+        <p:nvPicPr>
+          <p:cNvPr id="35" name="Picture 34"/>
+          <p:cNvPicPr>
+            <a:picLocks noChangeAspect="1"/>
+          </p:cNvPicPr>
+          <p:nvPr/>
+        </p:nvPicPr>
+        <p:blipFill>
+          <a:blip r:embed="rId7"/>
+          <a:stretch>
+            <a:fillRect/>
+          </a:stretch>
+        </p:blipFill>
+        <p:spPr>
+          <a:xfrm>
+            <a:off x="11001577" y="5570125"/>
+            <a:ext cx="725667" cy="630750"/>
+          </a:xfrm>
+          <a:prstGeom prst="rect">
+            <a:avLst/>
+          </a:prstGeom>
+        </p:spPr>
+      </p:pic>
+      <p:cxnSp>
+        <p:nvCxnSpPr>
+          <p:cNvPr id="38" name="Straight Arrow Connector 37"/>
+          <p:cNvCxnSpPr/>
+          <p:nvPr/>
+        </p:nvCxnSpPr>
+        <p:spPr>
+          <a:xfrm flipV="1">
+            <a:off x="8417025" y="2987182"/>
+            <a:ext cx="198147" cy="371460"/>
+          </a:xfrm>
+          <a:prstGeom prst="straightConnector1">
+            <a:avLst/>
+          </a:prstGeom>
+          <a:ln>
+            <a:tailEnd type="triangle"/>
+          </a:ln>
+        </p:spPr>
+        <p:style>
+          <a:lnRef idx="1">
+            <a:schemeClr val="accent1"/>
+          </a:lnRef>
+          <a:fillRef idx="0">
+            <a:schemeClr val="accent1"/>
+          </a:fillRef>
+          <a:effectRef idx="0">
+            <a:schemeClr val="accent1"/>
+          </a:effectRef>
+          <a:fontRef idx="minor">
+            <a:schemeClr val="tx1"/>
+          </a:fontRef>
+        </p:style>
+      </p:cxnSp>
+      <p:cxnSp>
+        <p:nvCxnSpPr>
+          <p:cNvPr id="41" name="Straight Arrow Connector 40"/>
+          <p:cNvCxnSpPr/>
+          <p:nvPr/>
+        </p:nvCxnSpPr>
+        <p:spPr>
+          <a:xfrm flipV="1">
+            <a:off x="8326350" y="2934712"/>
+            <a:ext cx="203215" cy="367424"/>
+          </a:xfrm>
+          <a:prstGeom prst="straightConnector1">
+            <a:avLst/>
+          </a:prstGeom>
+          <a:ln>
+            <a:tailEnd type="triangle"/>
+          </a:ln>
+        </p:spPr>
+        <p:style>
+          <a:lnRef idx="1">
+            <a:schemeClr val="accent1"/>
+          </a:lnRef>
+          <a:fillRef idx="0">
+            <a:schemeClr val="accent1"/>
+          </a:fillRef>
+          <a:effectRef idx="0">
+            <a:schemeClr val="accent1"/>
+          </a:effectRef>
+          <a:fontRef idx="minor">
+            <a:schemeClr val="tx1"/>
+          </a:fontRef>
+        </p:style>
+      </p:cxnSp>
+      <p:cxnSp>
+        <p:nvCxnSpPr>
+          <p:cNvPr id="47" name="Straight Arrow Connector 46"/>
+          <p:cNvCxnSpPr/>
+          <p:nvPr/>
+        </p:nvCxnSpPr>
+        <p:spPr>
+          <a:xfrm>
+            <a:off x="9717245" y="2982096"/>
+            <a:ext cx="399232" cy="374"/>
+          </a:xfrm>
+          <a:prstGeom prst="straightConnector1">
+            <a:avLst/>
+          </a:prstGeom>
+          <a:ln>
+            <a:tailEnd type="triangle"/>
+          </a:ln>
+        </p:spPr>
+        <p:style>
+          <a:lnRef idx="1">
+            <a:schemeClr val="accent1"/>
+          </a:lnRef>
+          <a:fillRef idx="0">
+            <a:schemeClr val="accent1"/>
+          </a:fillRef>
+          <a:effectRef idx="0">
+            <a:schemeClr val="accent1"/>
+          </a:effectRef>
+          <a:fontRef idx="minor">
+            <a:schemeClr val="tx1"/>
+          </a:fontRef>
+        </p:style>
+      </p:cxnSp>
+      <p:cxnSp>
+        <p:nvCxnSpPr>
+          <p:cNvPr id="52" name="Straight Arrow Connector 51"/>
+          <p:cNvCxnSpPr/>
+          <p:nvPr/>
+        </p:nvCxnSpPr>
+        <p:spPr>
+          <a:xfrm>
+            <a:off x="11455618" y="4246734"/>
+            <a:ext cx="0" cy="1202897"/>
+          </a:xfrm>
+          <a:prstGeom prst="straightConnector1">
+            <a:avLst/>
+          </a:prstGeom>
+          <a:ln>
+            <a:tailEnd type="triangle"/>
+          </a:ln>
+        </p:spPr>
+        <p:style>
+          <a:lnRef idx="1">
+            <a:schemeClr val="accent1"/>
+          </a:lnRef>
+          <a:fillRef idx="0">
+            <a:schemeClr val="accent1"/>
+          </a:fillRef>
+          <a:effectRef idx="0">
+            <a:schemeClr val="accent1"/>
+          </a:effectRef>
+          <a:fontRef idx="minor">
+            <a:schemeClr val="tx1"/>
+          </a:fontRef>
+        </p:style>
+      </p:cxnSp>
+      <p:cxnSp>
+        <p:nvCxnSpPr>
+          <p:cNvPr id="55" name="Straight Arrow Connector 54"/>
+          <p:cNvCxnSpPr/>
+          <p:nvPr/>
+        </p:nvCxnSpPr>
+        <p:spPr>
+          <a:xfrm flipH="1" flipV="1">
+            <a:off x="11242159" y="4246734"/>
+            <a:ext cx="1" cy="1192311"/>
+          </a:xfrm>
+          <a:prstGeom prst="straightConnector1">
+            <a:avLst/>
+          </a:prstGeom>
+          <a:ln>
+            <a:tailEnd type="triangle"/>
+          </a:ln>
+        </p:spPr>
+        <p:style>
+          <a:lnRef idx="1">
+            <a:schemeClr val="accent1"/>
+          </a:lnRef>
+          <a:fillRef idx="0">
+            <a:schemeClr val="accent1"/>
+          </a:fillRef>
+          <a:effectRef idx="0">
+            <a:schemeClr val="accent1"/>
+          </a:effectRef>
+          <a:fontRef idx="minor">
+            <a:schemeClr val="tx1"/>
+          </a:fontRef>
+        </p:style>
+      </p:cxnSp>
+      <p:pic>
+        <p:nvPicPr>
+          <p:cNvPr id="59" name="Picture 58"/>
+          <p:cNvPicPr>
+            <a:picLocks noChangeAspect="1"/>
+          </p:cNvPicPr>
+          <p:nvPr/>
+        </p:nvPicPr>
+        <p:blipFill>
+          <a:blip r:embed="rId8"/>
+          <a:stretch>
+            <a:fillRect/>
+          </a:stretch>
+        </p:blipFill>
+        <p:spPr>
+          <a:xfrm>
+            <a:off x="9425103" y="4194796"/>
+            <a:ext cx="740145" cy="666849"/>
+          </a:xfrm>
+          <a:prstGeom prst="rect">
+            <a:avLst/>
+          </a:prstGeom>
+        </p:spPr>
+      </p:pic>
+      <p:cxnSp>
+        <p:nvCxnSpPr>
+          <p:cNvPr id="60" name="Straight Arrow Connector 59"/>
+          <p:cNvCxnSpPr/>
+          <p:nvPr/>
+        </p:nvCxnSpPr>
+        <p:spPr>
+          <a:xfrm flipV="1">
+            <a:off x="10200108" y="4044601"/>
+            <a:ext cx="381093" cy="313088"/>
+          </a:xfrm>
+          <a:prstGeom prst="straightConnector1">
+            <a:avLst/>
+          </a:prstGeom>
+          <a:ln>
+            <a:tailEnd type="triangle"/>
+          </a:ln>
+        </p:spPr>
+        <p:style>
+          <a:lnRef idx="1">
+            <a:schemeClr val="accent1"/>
+          </a:lnRef>
+          <a:fillRef idx="0">
+            <a:schemeClr val="accent1"/>
+          </a:fillRef>
+          <a:effectRef idx="0">
+            <a:schemeClr val="accent1"/>
+          </a:effectRef>
+          <a:fontRef idx="minor">
+            <a:schemeClr val="tx1"/>
+          </a:fontRef>
+        </p:style>
+      </p:cxnSp>
+      <p:cxnSp>
+        <p:nvCxnSpPr>
+          <p:cNvPr id="64" name="Straight Arrow Connector 63"/>
+          <p:cNvCxnSpPr/>
+          <p:nvPr/>
+        </p:nvCxnSpPr>
+        <p:spPr>
+          <a:xfrm>
+            <a:off x="8337632" y="3527501"/>
+            <a:ext cx="10670" cy="631483"/>
+          </a:xfrm>
+          <a:prstGeom prst="straightConnector1">
+            <a:avLst/>
+          </a:prstGeom>
+          <a:ln>
+            <a:tailEnd type="triangle"/>
+          </a:ln>
+        </p:spPr>
+        <p:style>
+          <a:lnRef idx="1">
+            <a:schemeClr val="accent1"/>
+          </a:lnRef>
+          <a:fillRef idx="0">
+            <a:schemeClr val="accent1"/>
+          </a:fillRef>
+          <a:effectRef idx="0">
+            <a:schemeClr val="accent1"/>
+          </a:effectRef>
+          <a:fontRef idx="minor">
+            <a:schemeClr val="tx1"/>
+          </a:fontRef>
+        </p:style>
+      </p:cxnSp>
+      <p:grpSp>
+        <p:nvGrpSpPr>
+          <p:cNvPr id="67" name="Group 66"/>
+          <p:cNvGrpSpPr/>
+          <p:nvPr/>
+        </p:nvGrpSpPr>
+        <p:grpSpPr>
+          <a:xfrm>
+            <a:off x="8087495" y="4214828"/>
+            <a:ext cx="788381" cy="692401"/>
+            <a:chOff x="9999814" y="2265031"/>
+            <a:chExt cx="652417" cy="608250"/>
+          </a:xfrm>
+        </p:grpSpPr>
+        <p:pic>
+          <p:nvPicPr>
+            <p:cNvPr id="68" name="Picture 67"/>
+            <p:cNvPicPr>
+              <a:picLocks noChangeAspect="1"/>
+            </p:cNvPicPr>
+            <p:nvPr/>
+          </p:nvPicPr>
+          <p:blipFill>
+            <a:blip r:embed="rId5"/>
+            <a:stretch>
+              <a:fillRect/>
+            </a:stretch>
+          </p:blipFill>
+          <p:spPr>
+            <a:xfrm>
+              <a:off x="9999814" y="2265031"/>
+              <a:ext cx="652417" cy="608250"/>
+            </a:xfrm>
+            <a:prstGeom prst="rect">
+              <a:avLst/>
+            </a:prstGeom>
+          </p:spPr>
+        </p:pic>
+        <p:sp>
+          <p:nvSpPr>
+            <p:cNvPr id="69" name="TextBox 68"/>
+            <p:cNvSpPr txBox="1"/>
+            <p:nvPr/>
+          </p:nvSpPr>
+          <p:spPr>
+            <a:xfrm>
+              <a:off x="9999814" y="2541141"/>
+              <a:ext cx="481161" cy="216297"/>
+            </a:xfrm>
+            <a:prstGeom prst="rect">
+              <a:avLst/>
+            </a:prstGeom>
+            <a:noFill/>
+          </p:spPr>
+          <p:txBody>
+            <a:bodyPr wrap="square" rtlCol="0">
+              <a:spAutoFit/>
+            </a:bodyPr>
+            <a:lstStyle/>
+            <a:p>
+              <a:r>
+                <a:rPr lang="en-GB" sz="1000" dirty="0">
+                  <a:solidFill>
+                    <a:schemeClr val="bg1"/>
+                  </a:solidFill>
+                </a:rPr>
+                <a:t>DSVM</a:t>
+              </a:r>
+            </a:p>
+          </p:txBody>
+        </p:sp>
+      </p:grpSp>
+      <p:cxnSp>
+        <p:nvCxnSpPr>
+          <p:cNvPr id="73" name="Straight Arrow Connector 72"/>
+          <p:cNvCxnSpPr>
+            <a:endCxn id="59" idx="1"/>
+          </p:cNvCxnSpPr>
+          <p:nvPr/>
+        </p:nvCxnSpPr>
+        <p:spPr>
+          <a:xfrm>
+            <a:off x="8923943" y="4522554"/>
+            <a:ext cx="501160" cy="5667"/>
+          </a:xfrm>
+          <a:prstGeom prst="straightConnector1">
+            <a:avLst/>
+          </a:prstGeom>
+          <a:ln>
+            <a:tailEnd type="triangle"/>
+          </a:ln>
+        </p:spPr>
+        <p:style>
+          <a:lnRef idx="1">
+            <a:schemeClr val="accent1"/>
+          </a:lnRef>
+          <a:fillRef idx="0">
+            <a:schemeClr val="accent1"/>
+          </a:fillRef>
+          <a:effectRef idx="0">
+            <a:schemeClr val="accent1"/>
+          </a:effectRef>
+          <a:fontRef idx="minor">
+            <a:schemeClr val="tx1"/>
+          </a:fontRef>
+        </p:style>
+      </p:cxnSp>
+      <p:pic>
+        <p:nvPicPr>
+          <p:cNvPr id="79" name="Picture 2" descr="https://cdn.turbonomic.com/wp-content/uploads/2014/04/ContainerIconBlue-min.jpg"/>
+          <p:cNvPicPr>
+            <a:picLocks noChangeAspect="1" noChangeArrowheads="1"/>
+          </p:cNvPicPr>
+          <p:nvPr/>
+        </p:nvPicPr>
+        <p:blipFill>
+          <a:blip r:embed="rId9">
+            <a:extLst>
+              <a:ext uri="{28A0092B-C50C-407E-A947-70E740481C1C}">
+                <a14:useLocalDpi xmlns:a14="http://schemas.microsoft.com/office/drawing/2010/main" val="0"/>
+              </a:ext>
+            </a:extLst>
+          </a:blip>
+          <a:srcRect/>
+          <a:stretch>
+            <a:fillRect/>
+          </a:stretch>
+        </p:blipFill>
+        <p:spPr bwMode="auto">
+          <a:xfrm>
+            <a:off x="10416588" y="3441527"/>
+            <a:ext cx="286012" cy="272331"/>
+          </a:xfrm>
+          <a:prstGeom prst="rect">
+            <a:avLst/>
+          </a:prstGeom>
+          <a:noFill/>
+          <a:extLst>
+            <a:ext uri="{909E8E84-426E-40DD-AFC4-6F175D3DCCD1}">
+              <a14:hiddenFill xmlns:a14="http://schemas.microsoft.com/office/drawing/2010/main">
+                <a:solidFill>
+                  <a:srgbClr val="FFFFFF"/>
+                </a:solidFill>
+              </a14:hiddenFill>
+            </a:ext>
+          </a:extLst>
+        </p:spPr>
+      </p:pic>
+      <p:pic>
+        <p:nvPicPr>
+          <p:cNvPr id="80" name="Picture 2" descr="https://cdn.turbonomic.com/wp-content/uploads/2014/04/ContainerIconBlue-min.jpg"/>
+          <p:cNvPicPr>
+            <a:picLocks noChangeAspect="1" noChangeArrowheads="1"/>
+          </p:cNvPicPr>
+          <p:nvPr/>
+        </p:nvPicPr>
+        <p:blipFill>
+          <a:blip r:embed="rId10">
+            <a:extLst>
+              <a:ext uri="{BEBA8EAE-BF5A-486C-A8C5-ECC9F3942E4B}">
+                <a14:imgProps xmlns:a14="http://schemas.microsoft.com/office/drawing/2010/main">
+                  <a14:imgLayer r:embed="rId11">
+                    <a14:imgEffect>
+                      <a14:backgroundRemoval t="0" b="100000" l="0" r="100000">
+                        <a14:foregroundMark x1="37000" y1="53500" x2="37000" y2="53500"/>
+                        <a14:foregroundMark x1="20000" y1="48500" x2="20000" y2="31000"/>
+                        <a14:foregroundMark x1="20000" y1="23500" x2="20500" y2="82000"/>
+                        <a14:foregroundMark x1="38000" y1="32000" x2="37500" y2="69500"/>
+                        <a14:foregroundMark x1="37500" y1="24500" x2="38500" y2="76500"/>
+                        <a14:foregroundMark x1="52500" y1="27500" x2="53000" y2="74500"/>
+                        <a14:foregroundMark x1="68000" y1="33000" x2="67500" y2="70500"/>
+                        <a14:foregroundMark x1="81000" y1="36000" x2="81000" y2="64000"/>
+                        <a14:foregroundMark x1="92500" y1="39000" x2="92500" y2="62000"/>
+                        <a14:foregroundMark x1="13500" y1="22500" x2="14000" y2="81000"/>
+                        <a14:foregroundMark x1="8500" y1="26500" x2="8000" y2="74500"/>
+                        <a14:foregroundMark x1="3500" y1="29000" x2="3500" y2="72500"/>
+                        <a14:foregroundMark x1="80000" y1="33000" x2="80000" y2="68500"/>
+                      </a14:backgroundRemoval>
+                    </a14:imgEffect>
+                  </a14:imgLayer>
+                </a14:imgProps>
+              </a:ext>
+              <a:ext uri="{28A0092B-C50C-407E-A947-70E740481C1C}">
+                <a14:useLocalDpi xmlns:a14="http://schemas.microsoft.com/office/drawing/2010/main" val="0"/>
+              </a:ext>
+            </a:extLst>
+          </a:blip>
+          <a:srcRect/>
+          <a:stretch>
+            <a:fillRect/>
+          </a:stretch>
+        </p:blipFill>
+        <p:spPr bwMode="auto">
+          <a:xfrm>
+            <a:off x="10480919" y="3518918"/>
+            <a:ext cx="339590" cy="291935"/>
+          </a:xfrm>
+          <a:prstGeom prst="rect">
+            <a:avLst/>
+          </a:prstGeom>
+          <a:noFill/>
+          <a:extLst>
+            <a:ext uri="{909E8E84-426E-40DD-AFC4-6F175D3DCCD1}">
+              <a14:hiddenFill xmlns:a14="http://schemas.microsoft.com/office/drawing/2010/main">
+                <a:solidFill>
+                  <a:srgbClr val="FFFFFF"/>
+                </a:solidFill>
+              </a14:hiddenFill>
+            </a:ext>
+          </a:extLst>
+        </p:spPr>
+      </p:pic>
+      <p:pic>
+        <p:nvPicPr>
+          <p:cNvPr id="81" name="Picture 2" descr="https://cdn.turbonomic.com/wp-content/uploads/2014/04/ContainerIconBlue-min.jpg"/>
+          <p:cNvPicPr>
+            <a:picLocks noChangeAspect="1" noChangeArrowheads="1"/>
+          </p:cNvPicPr>
+          <p:nvPr/>
+        </p:nvPicPr>
+        <p:blipFill>
+          <a:blip r:embed="rId10">
+            <a:extLst>
+              <a:ext uri="{BEBA8EAE-BF5A-486C-A8C5-ECC9F3942E4B}">
+                <a14:imgProps xmlns:a14="http://schemas.microsoft.com/office/drawing/2010/main">
+                  <a14:imgLayer r:embed="rId11">
+                    <a14:imgEffect>
+                      <a14:backgroundRemoval t="0" b="100000" l="0" r="100000">
+                        <a14:foregroundMark x1="37000" y1="53500" x2="37000" y2="53500"/>
+                        <a14:foregroundMark x1="20000" y1="48500" x2="20000" y2="31000"/>
+                        <a14:foregroundMark x1="20000" y1="23500" x2="20500" y2="82000"/>
+                        <a14:foregroundMark x1="38000" y1="32000" x2="37500" y2="69500"/>
+                        <a14:foregroundMark x1="37500" y1="24500" x2="38500" y2="76500"/>
+                        <a14:foregroundMark x1="52500" y1="27500" x2="53000" y2="74500"/>
+                        <a14:foregroundMark x1="68000" y1="33000" x2="67500" y2="70500"/>
+                        <a14:foregroundMark x1="81000" y1="36000" x2="81000" y2="64000"/>
+                        <a14:foregroundMark x1="92500" y1="39000" x2="92500" y2="62000"/>
+                        <a14:foregroundMark x1="13500" y1="22500" x2="14000" y2="81000"/>
+                        <a14:foregroundMark x1="8500" y1="26500" x2="8000" y2="74500"/>
+                        <a14:foregroundMark x1="3500" y1="29000" x2="3500" y2="72500"/>
+                        <a14:foregroundMark x1="80000" y1="33000" x2="80000" y2="68500"/>
+                      </a14:backgroundRemoval>
+                    </a14:imgEffect>
+                  </a14:imgLayer>
+                </a14:imgProps>
+              </a:ext>
+              <a:ext uri="{28A0092B-C50C-407E-A947-70E740481C1C}">
+                <a14:useLocalDpi xmlns:a14="http://schemas.microsoft.com/office/drawing/2010/main" val="0"/>
+              </a:ext>
+            </a:extLst>
+          </a:blip>
+          <a:srcRect/>
+          <a:stretch>
+            <a:fillRect/>
+          </a:stretch>
+        </p:blipFill>
+        <p:spPr bwMode="auto">
+          <a:xfrm>
+            <a:off x="10565354" y="3637739"/>
+            <a:ext cx="339590" cy="291935"/>
+          </a:xfrm>
+          <a:prstGeom prst="rect">
+            <a:avLst/>
+          </a:prstGeom>
+          <a:noFill/>
+          <a:extLst>
+            <a:ext uri="{909E8E84-426E-40DD-AFC4-6F175D3DCCD1}">
+              <a14:hiddenFill xmlns:a14="http://schemas.microsoft.com/office/drawing/2010/main">
+                <a:solidFill>
+                  <a:srgbClr val="FFFFFF"/>
+                </a:solidFill>
+              </a14:hiddenFill>
+            </a:ext>
+          </a:extLst>
+        </p:spPr>
+      </p:pic>
+      <p:pic>
+        <p:nvPicPr>
+          <p:cNvPr id="82" name="Picture 2" descr="https://cdn.turbonomic.com/wp-content/uploads/2014/04/ContainerIconBlue-min.jpg"/>
+          <p:cNvPicPr>
+            <a:picLocks noChangeAspect="1" noChangeArrowheads="1"/>
+          </p:cNvPicPr>
+          <p:nvPr/>
+        </p:nvPicPr>
+        <p:blipFill>
+          <a:blip r:embed="rId10">
+            <a:extLst>
+              <a:ext uri="{BEBA8EAE-BF5A-486C-A8C5-ECC9F3942E4B}">
+                <a14:imgProps xmlns:a14="http://schemas.microsoft.com/office/drawing/2010/main">
+                  <a14:imgLayer r:embed="rId11">
+                    <a14:imgEffect>
+                      <a14:backgroundRemoval t="0" b="100000" l="0" r="100000">
+                        <a14:foregroundMark x1="37000" y1="53500" x2="37000" y2="53500"/>
+                        <a14:foregroundMark x1="20000" y1="48500" x2="20000" y2="31000"/>
+                        <a14:foregroundMark x1="20000" y1="23500" x2="20500" y2="82000"/>
+                        <a14:foregroundMark x1="38000" y1="32000" x2="37500" y2="69500"/>
+                        <a14:foregroundMark x1="37500" y1="24500" x2="38500" y2="76500"/>
+                        <a14:foregroundMark x1="52500" y1="27500" x2="53000" y2="74500"/>
+                        <a14:foregroundMark x1="68000" y1="33000" x2="67500" y2="70500"/>
+                        <a14:foregroundMark x1="81000" y1="36000" x2="81000" y2="64000"/>
+                        <a14:foregroundMark x1="92500" y1="39000" x2="92500" y2="62000"/>
+                        <a14:foregroundMark x1="13500" y1="22500" x2="14000" y2="81000"/>
+                        <a14:foregroundMark x1="8500" y1="26500" x2="8000" y2="74500"/>
+                        <a14:foregroundMark x1="3500" y1="29000" x2="3500" y2="72500"/>
+                        <a14:foregroundMark x1="80000" y1="33000" x2="80000" y2="68500"/>
+                      </a14:backgroundRemoval>
+                    </a14:imgEffect>
+                  </a14:imgLayer>
+                </a14:imgProps>
+              </a:ext>
+              <a:ext uri="{28A0092B-C50C-407E-A947-70E740481C1C}">
+                <a14:useLocalDpi xmlns:a14="http://schemas.microsoft.com/office/drawing/2010/main" val="0"/>
+              </a:ext>
+            </a:extLst>
+          </a:blip>
+          <a:srcRect/>
+          <a:stretch>
+            <a:fillRect/>
+          </a:stretch>
+        </p:blipFill>
+        <p:spPr bwMode="auto">
+          <a:xfrm>
+            <a:off x="10692932" y="3752666"/>
+            <a:ext cx="339590" cy="291935"/>
+          </a:xfrm>
+          <a:prstGeom prst="rect">
+            <a:avLst/>
+          </a:prstGeom>
+          <a:noFill/>
+          <a:extLst>
+            <a:ext uri="{909E8E84-426E-40DD-AFC4-6F175D3DCCD1}">
+              <a14:hiddenFill xmlns:a14="http://schemas.microsoft.com/office/drawing/2010/main">
+                <a:solidFill>
+                  <a:srgbClr val="FFFFFF"/>
+                </a:solidFill>
+              </a14:hiddenFill>
+            </a:ext>
+          </a:extLst>
+        </p:spPr>
+      </p:pic>
+      <p:sp>
+        <p:nvSpPr>
+          <p:cNvPr id="85" name="Title 1"/>
+          <p:cNvSpPr>
+            <a:spLocks noGrp="1"/>
+          </p:cNvSpPr>
+          <p:nvPr>
+            <p:ph type="title"/>
+          </p:nvPr>
+        </p:nvSpPr>
+        <p:spPr>
+          <a:xfrm>
+            <a:off x="269240" y="289511"/>
+            <a:ext cx="11655840" cy="899665"/>
+          </a:xfrm>
+        </p:spPr>
+        <p:txBody>
+          <a:bodyPr/>
+          <a:lstStyle/>
+          <a:p>
+            <a:r>
+              <a:rPr lang="en-GB" dirty="0"/>
+              <a:t>DNN Training Example Workflow with ABS</a:t>
+            </a:r>
+          </a:p>
+        </p:txBody>
+      </p:sp>
+      <p:pic>
+        <p:nvPicPr>
+          <p:cNvPr id="86" name="Picture 6" descr="https://azurecomcdn.azureedge.net/cvt-4c210654e280636c85b81aae4511f99613c7de5d03801bf44dc15fe823371003/images/page/services/batch/we-take-care-of-scale.png"/>
+          <p:cNvPicPr>
+            <a:picLocks noChangeAspect="1" noChangeArrowheads="1"/>
+          </p:cNvPicPr>
+          <p:nvPr/>
+        </p:nvPicPr>
+        <p:blipFill>
+          <a:blip r:embed="rId12">
+            <a:extLst>
+              <a:ext uri="{28A0092B-C50C-407E-A947-70E740481C1C}">
+                <a14:useLocalDpi xmlns:a14="http://schemas.microsoft.com/office/drawing/2010/main" val="0"/>
+              </a:ext>
+            </a:extLst>
+          </a:blip>
+          <a:srcRect/>
+          <a:stretch>
+            <a:fillRect/>
+          </a:stretch>
+        </p:blipFill>
+        <p:spPr bwMode="auto">
+          <a:xfrm>
+            <a:off x="8621801" y="1399154"/>
+            <a:ext cx="658080" cy="423051"/>
+          </a:xfrm>
+          <a:prstGeom prst="rect">
+            <a:avLst/>
+          </a:prstGeom>
+          <a:noFill/>
+          <a:extLst>
+            <a:ext uri="{909E8E84-426E-40DD-AFC4-6F175D3DCCD1}">
+              <a14:hiddenFill xmlns:a14="http://schemas.microsoft.com/office/drawing/2010/main">
+                <a:solidFill>
+                  <a:srgbClr val="FFFFFF"/>
+                </a:solidFill>
+              </a14:hiddenFill>
+            </a:ext>
+          </a:extLst>
+        </p:spPr>
+      </p:pic>
+      <p:sp>
+        <p:nvSpPr>
+          <p:cNvPr id="2" name="Oval 1"/>
+          <p:cNvSpPr/>
+          <p:nvPr/>
+        </p:nvSpPr>
+        <p:spPr bwMode="auto">
+          <a:xfrm>
+            <a:off x="8008816" y="3702604"/>
+            <a:ext cx="195444" cy="196029"/>
+          </a:xfrm>
+          <a:prstGeom prst="ellipse">
+            <a:avLst/>
+          </a:prstGeom>
+          <a:ln>
+            <a:noFill/>
+            <a:headEnd type="none" w="med" len="med"/>
+            <a:tailEnd type="none" w="med" len="med"/>
+          </a:ln>
+        </p:spPr>
+        <p:style>
+          <a:lnRef idx="2">
+            <a:schemeClr val="accent1">
+              <a:shade val="50000"/>
+            </a:schemeClr>
+          </a:lnRef>
+          <a:fillRef idx="1">
+            <a:schemeClr val="accent1"/>
+          </a:fillRef>
+          <a:effectRef idx="0">
+            <a:schemeClr val="accent1"/>
+          </a:effectRef>
+          <a:fontRef idx="minor">
+            <a:schemeClr val="lt1"/>
+          </a:fontRef>
+        </p:style>
+        <p:txBody>
+          <a:bodyPr vert="horz" wrap="square" lIns="0" tIns="46637" rIns="0" bIns="46637" numCol="1" rtlCol="0" anchor="ctr" anchorCtr="0" compatLnSpc="1">
+            <a:prstTxWarp prst="textNoShape">
+              <a:avLst/>
+            </a:prstTxWarp>
+          </a:bodyPr>
+          <a:lstStyle/>
+          <a:p>
+            <a:pPr algn="ctr" defTabSz="932472" fontAlgn="base">
+              <a:spcBef>
+                <a:spcPct val="0"/>
+              </a:spcBef>
+              <a:spcAft>
+                <a:spcPct val="0"/>
+              </a:spcAft>
+            </a:pPr>
+            <a:r>
+              <a:rPr lang="en-US" sz="1200" dirty="0">
+                <a:gradFill>
+                  <a:gsLst>
+                    <a:gs pos="0">
+                      <a:srgbClr val="FFFFFF"/>
+                    </a:gs>
+                    <a:gs pos="100000">
+                      <a:srgbClr val="FFFFFF"/>
+                    </a:gs>
+                  </a:gsLst>
+                  <a:lin ang="5400000" scaled="0"/>
+                </a:gradFill>
+              </a:rPr>
+              <a:t>1</a:t>
+            </a:r>
+            <a:endParaRPr lang="en-GB" sz="2000" dirty="0">
+              <a:gradFill>
+                <a:gsLst>
+                  <a:gs pos="0">
+                    <a:srgbClr val="FFFFFF"/>
+                  </a:gs>
+                  <a:gs pos="100000">
+                    <a:srgbClr val="FFFFFF"/>
+                  </a:gs>
+                </a:gsLst>
+                <a:lin ang="5400000" scaled="0"/>
+              </a:gradFill>
+            </a:endParaRPr>
+          </a:p>
+        </p:txBody>
+      </p:sp>
+      <p:sp>
+        <p:nvSpPr>
+          <p:cNvPr id="33" name="Oval 32"/>
+          <p:cNvSpPr/>
+          <p:nvPr/>
+        </p:nvSpPr>
+        <p:spPr bwMode="auto">
+          <a:xfrm>
+            <a:off x="9084437" y="4270734"/>
+            <a:ext cx="195444" cy="196029"/>
+          </a:xfrm>
+          <a:prstGeom prst="ellipse">
+            <a:avLst/>
+          </a:prstGeom>
+          <a:ln>
+            <a:noFill/>
+            <a:headEnd type="none" w="med" len="med"/>
+            <a:tailEnd type="none" w="med" len="med"/>
+          </a:ln>
+        </p:spPr>
+        <p:style>
+          <a:lnRef idx="2">
+            <a:schemeClr val="accent1">
+              <a:shade val="50000"/>
+            </a:schemeClr>
+          </a:lnRef>
+          <a:fillRef idx="1">
+            <a:schemeClr val="accent1"/>
+          </a:fillRef>
+          <a:effectRef idx="0">
+            <a:schemeClr val="accent1"/>
+          </a:effectRef>
+          <a:fontRef idx="minor">
+            <a:schemeClr val="lt1"/>
+          </a:fontRef>
+        </p:style>
+        <p:txBody>
+          <a:bodyPr vert="horz" wrap="square" lIns="0" tIns="46637" rIns="0" bIns="46637" numCol="1" rtlCol="0" anchor="ctr" anchorCtr="0" compatLnSpc="1">
+            <a:prstTxWarp prst="textNoShape">
+              <a:avLst/>
+            </a:prstTxWarp>
+          </a:bodyPr>
+          <a:lstStyle/>
+          <a:p>
+            <a:pPr algn="ctr" defTabSz="932472" fontAlgn="base">
+              <a:spcBef>
+                <a:spcPct val="0"/>
+              </a:spcBef>
+              <a:spcAft>
+                <a:spcPct val="0"/>
+              </a:spcAft>
+            </a:pPr>
+            <a:r>
+              <a:rPr lang="en-US" sz="1200" dirty="0">
+                <a:gradFill>
+                  <a:gsLst>
+                    <a:gs pos="0">
+                      <a:srgbClr val="FFFFFF"/>
+                    </a:gs>
+                    <a:gs pos="100000">
+                      <a:srgbClr val="FFFFFF"/>
+                    </a:gs>
+                  </a:gsLst>
+                  <a:lin ang="5400000" scaled="0"/>
+                </a:gradFill>
+              </a:rPr>
+              <a:t>2</a:t>
+            </a:r>
+            <a:endParaRPr lang="en-GB" sz="2000" dirty="0">
+              <a:gradFill>
+                <a:gsLst>
+                  <a:gs pos="0">
+                    <a:srgbClr val="FFFFFF"/>
+                  </a:gs>
+                  <a:gs pos="100000">
+                    <a:srgbClr val="FFFFFF"/>
+                  </a:gs>
+                </a:gsLst>
+                <a:lin ang="5400000" scaled="0"/>
+              </a:gradFill>
+            </a:endParaRPr>
+          </a:p>
+        </p:txBody>
+      </p:sp>
+      <p:sp>
+        <p:nvSpPr>
+          <p:cNvPr id="36" name="Oval 35"/>
+          <p:cNvSpPr/>
+          <p:nvPr/>
+        </p:nvSpPr>
+        <p:spPr bwMode="auto">
+          <a:xfrm>
+            <a:off x="8191505" y="2884081"/>
+            <a:ext cx="195444" cy="196029"/>
+          </a:xfrm>
+          <a:prstGeom prst="ellipse">
+            <a:avLst/>
+          </a:prstGeom>
+          <a:ln>
+            <a:noFill/>
+            <a:headEnd type="none" w="med" len="med"/>
+            <a:tailEnd type="none" w="med" len="med"/>
+          </a:ln>
+        </p:spPr>
+        <p:style>
+          <a:lnRef idx="2">
+            <a:schemeClr val="accent1">
+              <a:shade val="50000"/>
+            </a:schemeClr>
+          </a:lnRef>
+          <a:fillRef idx="1">
+            <a:schemeClr val="accent1"/>
+          </a:fillRef>
+          <a:effectRef idx="0">
+            <a:schemeClr val="accent1"/>
+          </a:effectRef>
+          <a:fontRef idx="minor">
+            <a:schemeClr val="lt1"/>
+          </a:fontRef>
+        </p:style>
+        <p:txBody>
+          <a:bodyPr vert="horz" wrap="square" lIns="0" tIns="46637" rIns="0" bIns="46637" numCol="1" rtlCol="0" anchor="ctr" anchorCtr="0" compatLnSpc="1">
+            <a:prstTxWarp prst="textNoShape">
+              <a:avLst/>
+            </a:prstTxWarp>
+          </a:bodyPr>
+          <a:lstStyle/>
+          <a:p>
+            <a:pPr algn="ctr" defTabSz="932472" fontAlgn="base">
+              <a:spcBef>
+                <a:spcPct val="0"/>
+              </a:spcBef>
+              <a:spcAft>
+                <a:spcPct val="0"/>
+              </a:spcAft>
+            </a:pPr>
+            <a:r>
+              <a:rPr lang="en-US" sz="1200" dirty="0">
+                <a:gradFill>
+                  <a:gsLst>
+                    <a:gs pos="0">
+                      <a:srgbClr val="FFFFFF"/>
+                    </a:gs>
+                    <a:gs pos="100000">
+                      <a:srgbClr val="FFFFFF"/>
+                    </a:gs>
+                  </a:gsLst>
+                  <a:lin ang="5400000" scaled="0"/>
+                </a:gradFill>
+              </a:rPr>
+              <a:t>3</a:t>
+            </a:r>
+            <a:endParaRPr lang="en-GB" sz="2000" dirty="0">
+              <a:gradFill>
+                <a:gsLst>
+                  <a:gs pos="0">
+                    <a:srgbClr val="FFFFFF"/>
+                  </a:gs>
+                  <a:gs pos="100000">
+                    <a:srgbClr val="FFFFFF"/>
+                  </a:gs>
+                </a:gsLst>
+                <a:lin ang="5400000" scaled="0"/>
+              </a:gradFill>
+            </a:endParaRPr>
+          </a:p>
+        </p:txBody>
+      </p:sp>
+      <p:sp>
+        <p:nvSpPr>
+          <p:cNvPr id="37" name="Oval 36"/>
+          <p:cNvSpPr/>
+          <p:nvPr/>
+        </p:nvSpPr>
+        <p:spPr bwMode="auto">
+          <a:xfrm>
+            <a:off x="8546889" y="3225546"/>
+            <a:ext cx="195444" cy="196029"/>
+          </a:xfrm>
+          <a:prstGeom prst="ellipse">
+            <a:avLst/>
+          </a:prstGeom>
+          <a:ln>
+            <a:noFill/>
+            <a:headEnd type="none" w="med" len="med"/>
+            <a:tailEnd type="none" w="med" len="med"/>
+          </a:ln>
+        </p:spPr>
+        <p:style>
+          <a:lnRef idx="2">
+            <a:schemeClr val="accent1">
+              <a:shade val="50000"/>
+            </a:schemeClr>
+          </a:lnRef>
+          <a:fillRef idx="1">
+            <a:schemeClr val="accent1"/>
+          </a:fillRef>
+          <a:effectRef idx="0">
+            <a:schemeClr val="accent1"/>
+          </a:effectRef>
+          <a:fontRef idx="minor">
+            <a:schemeClr val="lt1"/>
+          </a:fontRef>
+        </p:style>
+        <p:txBody>
+          <a:bodyPr vert="horz" wrap="square" lIns="0" tIns="46637" rIns="0" bIns="46637" numCol="1" rtlCol="0" anchor="ctr" anchorCtr="0" compatLnSpc="1">
+            <a:prstTxWarp prst="textNoShape">
+              <a:avLst/>
+            </a:prstTxWarp>
+          </a:bodyPr>
+          <a:lstStyle/>
+          <a:p>
+            <a:pPr algn="ctr" defTabSz="932472" fontAlgn="base">
+              <a:spcBef>
+                <a:spcPct val="0"/>
+              </a:spcBef>
+              <a:spcAft>
+                <a:spcPct val="0"/>
+              </a:spcAft>
+            </a:pPr>
+            <a:r>
+              <a:rPr lang="en-US" sz="1200" dirty="0">
+                <a:gradFill>
+                  <a:gsLst>
+                    <a:gs pos="0">
+                      <a:srgbClr val="FFFFFF"/>
+                    </a:gs>
+                    <a:gs pos="100000">
+                      <a:srgbClr val="FFFFFF"/>
+                    </a:gs>
+                  </a:gsLst>
+                  <a:lin ang="5400000" scaled="0"/>
+                </a:gradFill>
+              </a:rPr>
+              <a:t>4</a:t>
+            </a:r>
+            <a:endParaRPr lang="en-GB" sz="2000" dirty="0">
+              <a:gradFill>
+                <a:gsLst>
+                  <a:gs pos="0">
+                    <a:srgbClr val="FFFFFF"/>
+                  </a:gs>
+                  <a:gs pos="100000">
+                    <a:srgbClr val="FFFFFF"/>
+                  </a:gs>
+                </a:gsLst>
+                <a:lin ang="5400000" scaled="0"/>
+              </a:gradFill>
+            </a:endParaRPr>
+          </a:p>
+        </p:txBody>
+      </p:sp>
+      <p:sp>
+        <p:nvSpPr>
+          <p:cNvPr id="39" name="Oval 38"/>
+          <p:cNvSpPr/>
+          <p:nvPr/>
+        </p:nvSpPr>
+        <p:spPr bwMode="auto">
+          <a:xfrm>
+            <a:off x="10195210" y="3941303"/>
+            <a:ext cx="195444" cy="196029"/>
+          </a:xfrm>
+          <a:prstGeom prst="ellipse">
+            <a:avLst/>
+          </a:prstGeom>
+          <a:ln>
+            <a:noFill/>
+            <a:headEnd type="none" w="med" len="med"/>
+            <a:tailEnd type="none" w="med" len="med"/>
+          </a:ln>
+        </p:spPr>
+        <p:style>
+          <a:lnRef idx="2">
+            <a:schemeClr val="accent1">
+              <a:shade val="50000"/>
+            </a:schemeClr>
+          </a:lnRef>
+          <a:fillRef idx="1">
+            <a:schemeClr val="accent1"/>
+          </a:fillRef>
+          <a:effectRef idx="0">
+            <a:schemeClr val="accent1"/>
+          </a:effectRef>
+          <a:fontRef idx="minor">
+            <a:schemeClr val="lt1"/>
+          </a:fontRef>
+        </p:style>
+        <p:txBody>
+          <a:bodyPr vert="horz" wrap="square" lIns="0" tIns="46637" rIns="0" bIns="46637" numCol="1" rtlCol="0" anchor="ctr" anchorCtr="0" compatLnSpc="1">
+            <a:prstTxWarp prst="textNoShape">
+              <a:avLst/>
+            </a:prstTxWarp>
+          </a:bodyPr>
+          <a:lstStyle/>
+          <a:p>
+            <a:pPr algn="ctr" defTabSz="932472" fontAlgn="base">
+              <a:spcBef>
+                <a:spcPct val="0"/>
+              </a:spcBef>
+              <a:spcAft>
+                <a:spcPct val="0"/>
+              </a:spcAft>
+            </a:pPr>
+            <a:r>
+              <a:rPr lang="en-US" sz="1200" dirty="0">
+                <a:gradFill>
+                  <a:gsLst>
+                    <a:gs pos="0">
+                      <a:srgbClr val="FFFFFF"/>
+                    </a:gs>
+                    <a:gs pos="100000">
+                      <a:srgbClr val="FFFFFF"/>
+                    </a:gs>
+                  </a:gsLst>
+                  <a:lin ang="5400000" scaled="0"/>
+                </a:gradFill>
+              </a:rPr>
+              <a:t>5</a:t>
+            </a:r>
+            <a:endParaRPr lang="en-GB" sz="2000" dirty="0">
+              <a:gradFill>
+                <a:gsLst>
+                  <a:gs pos="0">
+                    <a:srgbClr val="FFFFFF"/>
+                  </a:gs>
+                  <a:gs pos="100000">
+                    <a:srgbClr val="FFFFFF"/>
+                  </a:gs>
+                </a:gsLst>
+                <a:lin ang="5400000" scaled="0"/>
+              </a:gradFill>
+            </a:endParaRPr>
+          </a:p>
+        </p:txBody>
+      </p:sp>
+      <p:sp>
+        <p:nvSpPr>
+          <p:cNvPr id="40" name="Oval 39"/>
+          <p:cNvSpPr/>
+          <p:nvPr/>
+        </p:nvSpPr>
+        <p:spPr bwMode="auto">
+          <a:xfrm>
+            <a:off x="10977896" y="4744874"/>
+            <a:ext cx="195444" cy="196029"/>
+          </a:xfrm>
+          <a:prstGeom prst="ellipse">
+            <a:avLst/>
+          </a:prstGeom>
+          <a:ln>
+            <a:noFill/>
+            <a:headEnd type="none" w="med" len="med"/>
+            <a:tailEnd type="none" w="med" len="med"/>
+          </a:ln>
+        </p:spPr>
+        <p:style>
+          <a:lnRef idx="2">
+            <a:schemeClr val="accent1">
+              <a:shade val="50000"/>
+            </a:schemeClr>
+          </a:lnRef>
+          <a:fillRef idx="1">
+            <a:schemeClr val="accent1"/>
+          </a:fillRef>
+          <a:effectRef idx="0">
+            <a:schemeClr val="accent1"/>
+          </a:effectRef>
+          <a:fontRef idx="minor">
+            <a:schemeClr val="lt1"/>
+          </a:fontRef>
+        </p:style>
+        <p:txBody>
+          <a:bodyPr vert="horz" wrap="square" lIns="0" tIns="46637" rIns="0" bIns="46637" numCol="1" rtlCol="0" anchor="ctr" anchorCtr="0" compatLnSpc="1">
+            <a:prstTxWarp prst="textNoShape">
+              <a:avLst/>
+            </a:prstTxWarp>
+          </a:bodyPr>
+          <a:lstStyle/>
+          <a:p>
+            <a:pPr algn="ctr" defTabSz="932472" fontAlgn="base">
+              <a:spcBef>
+                <a:spcPct val="0"/>
+              </a:spcBef>
+              <a:spcAft>
+                <a:spcPct val="0"/>
+              </a:spcAft>
+            </a:pPr>
+            <a:r>
+              <a:rPr lang="en-US" sz="1200" dirty="0">
+                <a:gradFill>
+                  <a:gsLst>
+                    <a:gs pos="0">
+                      <a:srgbClr val="FFFFFF"/>
+                    </a:gs>
+                    <a:gs pos="100000">
+                      <a:srgbClr val="FFFFFF"/>
+                    </a:gs>
+                  </a:gsLst>
+                  <a:lin ang="5400000" scaled="0"/>
+                </a:gradFill>
+              </a:rPr>
+              <a:t>6</a:t>
+            </a:r>
+            <a:endParaRPr lang="en-GB" sz="2000" dirty="0">
+              <a:gradFill>
+                <a:gsLst>
+                  <a:gs pos="0">
+                    <a:srgbClr val="FFFFFF"/>
+                  </a:gs>
+                  <a:gs pos="100000">
+                    <a:srgbClr val="FFFFFF"/>
+                  </a:gs>
+                </a:gsLst>
+                <a:lin ang="5400000" scaled="0"/>
+              </a:gradFill>
+            </a:endParaRPr>
+          </a:p>
+        </p:txBody>
+      </p:sp>
+      <p:sp>
+        <p:nvSpPr>
+          <p:cNvPr id="42" name="Oval 41"/>
+          <p:cNvSpPr/>
+          <p:nvPr/>
+        </p:nvSpPr>
+        <p:spPr bwMode="auto">
+          <a:xfrm>
+            <a:off x="11531800" y="4750809"/>
+            <a:ext cx="195444" cy="196029"/>
+          </a:xfrm>
+          <a:prstGeom prst="ellipse">
+            <a:avLst/>
+          </a:prstGeom>
+          <a:ln>
+            <a:noFill/>
+            <a:headEnd type="none" w="med" len="med"/>
+            <a:tailEnd type="none" w="med" len="med"/>
+          </a:ln>
+        </p:spPr>
+        <p:style>
+          <a:lnRef idx="2">
+            <a:schemeClr val="accent1">
+              <a:shade val="50000"/>
+            </a:schemeClr>
+          </a:lnRef>
+          <a:fillRef idx="1">
+            <a:schemeClr val="accent1"/>
+          </a:fillRef>
+          <a:effectRef idx="0">
+            <a:schemeClr val="accent1"/>
+          </a:effectRef>
+          <a:fontRef idx="minor">
+            <a:schemeClr val="lt1"/>
+          </a:fontRef>
+        </p:style>
+        <p:txBody>
+          <a:bodyPr vert="horz" wrap="square" lIns="0" tIns="46637" rIns="0" bIns="46637" numCol="1" rtlCol="0" anchor="ctr" anchorCtr="0" compatLnSpc="1">
+            <a:prstTxWarp prst="textNoShape">
+              <a:avLst/>
+            </a:prstTxWarp>
+          </a:bodyPr>
+          <a:lstStyle/>
+          <a:p>
+            <a:pPr algn="ctr" defTabSz="932472" fontAlgn="base">
+              <a:spcBef>
+                <a:spcPct val="0"/>
+              </a:spcBef>
+              <a:spcAft>
+                <a:spcPct val="0"/>
+              </a:spcAft>
+            </a:pPr>
+            <a:r>
+              <a:rPr lang="en-US" sz="1200" dirty="0">
+                <a:gradFill>
+                  <a:gsLst>
+                    <a:gs pos="0">
+                      <a:srgbClr val="FFFFFF"/>
+                    </a:gs>
+                    <a:gs pos="100000">
+                      <a:srgbClr val="FFFFFF"/>
+                    </a:gs>
+                  </a:gsLst>
+                  <a:lin ang="5400000" scaled="0"/>
+                </a:gradFill>
+              </a:rPr>
+              <a:t>8</a:t>
+            </a:r>
+            <a:endParaRPr lang="en-GB" sz="2000" dirty="0">
+              <a:gradFill>
+                <a:gsLst>
+                  <a:gs pos="0">
+                    <a:srgbClr val="FFFFFF"/>
+                  </a:gs>
+                  <a:gs pos="100000">
+                    <a:srgbClr val="FFFFFF"/>
+                  </a:gs>
+                </a:gsLst>
+                <a:lin ang="5400000" scaled="0"/>
+              </a:gradFill>
+            </a:endParaRPr>
+          </a:p>
+        </p:txBody>
+      </p:sp>
+      <p:sp>
+        <p:nvSpPr>
+          <p:cNvPr id="43" name="Oval 42"/>
+          <p:cNvSpPr/>
+          <p:nvPr/>
+        </p:nvSpPr>
+        <p:spPr bwMode="auto">
+          <a:xfrm>
+            <a:off x="10189808" y="3307079"/>
+            <a:ext cx="195444" cy="196029"/>
+          </a:xfrm>
+          <a:prstGeom prst="ellipse">
+            <a:avLst/>
+          </a:prstGeom>
+          <a:ln>
+            <a:noFill/>
+            <a:headEnd type="none" w="med" len="med"/>
+            <a:tailEnd type="none" w="med" len="med"/>
+          </a:ln>
+        </p:spPr>
+        <p:style>
+          <a:lnRef idx="2">
+            <a:schemeClr val="accent1">
+              <a:shade val="50000"/>
+            </a:schemeClr>
+          </a:lnRef>
+          <a:fillRef idx="1">
+            <a:schemeClr val="accent1"/>
+          </a:fillRef>
+          <a:effectRef idx="0">
+            <a:schemeClr val="accent1"/>
+          </a:effectRef>
+          <a:fontRef idx="minor">
+            <a:schemeClr val="lt1"/>
+          </a:fontRef>
+        </p:style>
+        <p:txBody>
+          <a:bodyPr vert="horz" wrap="square" lIns="0" tIns="46637" rIns="0" bIns="46637" numCol="1" rtlCol="0" anchor="ctr" anchorCtr="0" compatLnSpc="1">
+            <a:prstTxWarp prst="textNoShape">
+              <a:avLst/>
+            </a:prstTxWarp>
+          </a:bodyPr>
+          <a:lstStyle/>
+          <a:p>
+            <a:pPr algn="ctr" defTabSz="932472" fontAlgn="base">
+              <a:spcBef>
+                <a:spcPct val="0"/>
+              </a:spcBef>
+              <a:spcAft>
+                <a:spcPct val="0"/>
+              </a:spcAft>
+            </a:pPr>
+            <a:r>
+              <a:rPr lang="en-US" sz="1200" dirty="0">
+                <a:gradFill>
+                  <a:gsLst>
+                    <a:gs pos="0">
+                      <a:srgbClr val="FFFFFF"/>
+                    </a:gs>
+                    <a:gs pos="100000">
+                      <a:srgbClr val="FFFFFF"/>
+                    </a:gs>
+                  </a:gsLst>
+                  <a:lin ang="5400000" scaled="0"/>
+                </a:gradFill>
+              </a:rPr>
+              <a:t>7</a:t>
+            </a:r>
+            <a:endParaRPr lang="en-GB" sz="2000" dirty="0">
+              <a:gradFill>
+                <a:gsLst>
+                  <a:gs pos="0">
+                    <a:srgbClr val="FFFFFF"/>
+                  </a:gs>
+                  <a:gs pos="100000">
+                    <a:srgbClr val="FFFFFF"/>
+                  </a:gs>
+                </a:gsLst>
+                <a:lin ang="5400000" scaled="0"/>
+              </a:gradFill>
+            </a:endParaRPr>
+          </a:p>
+        </p:txBody>
+      </p:sp>
+      <p:cxnSp>
+        <p:nvCxnSpPr>
+          <p:cNvPr id="44" name="Straight Arrow Connector 43"/>
+          <p:cNvCxnSpPr/>
+          <p:nvPr/>
+        </p:nvCxnSpPr>
+        <p:spPr>
+          <a:xfrm>
+            <a:off x="9717245" y="3082664"/>
+            <a:ext cx="399232" cy="1"/>
+          </a:xfrm>
+          <a:prstGeom prst="straightConnector1">
+            <a:avLst/>
+          </a:prstGeom>
+          <a:ln>
+            <a:tailEnd type="triangle"/>
+          </a:ln>
+        </p:spPr>
+        <p:style>
+          <a:lnRef idx="1">
+            <a:schemeClr val="accent1"/>
+          </a:lnRef>
+          <a:fillRef idx="0">
+            <a:schemeClr val="accent1"/>
+          </a:fillRef>
+          <a:effectRef idx="0">
+            <a:schemeClr val="accent1"/>
+          </a:effectRef>
+          <a:fontRef idx="minor">
+            <a:schemeClr val="tx1"/>
+          </a:fontRef>
+        </p:style>
+      </p:cxnSp>
+    </p:spTree>
+    <p:extLst>
+      <p:ext uri="{BB962C8B-B14F-4D97-AF65-F5344CB8AC3E}">
+        <p14:creationId xmlns:p14="http://schemas.microsoft.com/office/powerpoint/2010/main" val="3460190970"/>
+      </p:ext>
+    </p:extLst>
+  </p:cSld>
+  <p:clrMapOvr>
+    <a:masterClrMapping/>
+  </p:clrMapOvr>
+  <p:transition>
+    <p:fade/>
+  </p:transition>
+  <p:timing>
+    <p:tnLst>
+      <p:par>
+        <p:cTn id="1" dur="indefinite" restart="never" nodeType="tmRoot">
+          <p:childTnLst>
+            <p:seq concurrent="1" nextAc="seek">
+              <p:cTn id="2" dur="indefinite" nodeType="mainSeq">
+                <p:childTnLst>
+                  <p:par>
+                    <p:cTn id="3" fill="hold">
+                      <p:stCondLst>
+                        <p:cond delay="indefinite"/>
+                        <p:cond evt="onBegin" delay="0">
+                          <p:tn val="2"/>
+                        </p:cond>
+                      </p:stCondLst>
+                      <p:childTnLst>
+                        <p:par>
+                          <p:cTn id="4" fill="hold">
+                            <p:stCondLst>
+                              <p:cond delay="0"/>
+                            </p:stCondLst>
+                            <p:childTnLst>
+                              <p:par>
+                                <p:cTn id="5" presetID="1" presetClass="entr" presetSubtype="0" fill="hold" grpId="0" nodeType="withEffect">
+                                  <p:stCondLst>
+                                    <p:cond delay="0"/>
+                                  </p:stCondLst>
+                                  <p:childTnLst>
+                                    <p:set>
+                                      <p:cBhvr>
+                                        <p:cTn id="6" dur="1" fill="hold">
+                                          <p:stCondLst>
+                                            <p:cond delay="0"/>
+                                          </p:stCondLst>
+                                        </p:cTn>
+                                        <p:tgtEl>
+                                          <p:spTgt spid="22">
+                                            <p:txEl>
+                                              <p:pRg st="0" end="0"/>
+                                            </p:txEl>
+                                          </p:spTgt>
+                                        </p:tgtEl>
+                                        <p:attrNameLst>
+                                          <p:attrName>style.visibility</p:attrName>
+                                        </p:attrNameLst>
+                                      </p:cBhvr>
+                                      <p:to>
+                                        <p:strVal val="visible"/>
+                                      </p:to>
+                                    </p:set>
+                                  </p:childTnLst>
+                                </p:cTn>
+                              </p:par>
+                            </p:childTnLst>
+                          </p:cTn>
+                        </p:par>
+                        <p:par>
+                          <p:cTn id="7" fill="hold">
+                            <p:stCondLst>
+                              <p:cond delay="0"/>
+                            </p:stCondLst>
+                            <p:childTnLst>
+                              <p:par>
+                                <p:cTn id="8" presetID="1" presetClass="entr" presetSubtype="0" fill="hold" nodeType="afterEffect">
+                                  <p:stCondLst>
+                                    <p:cond delay="500"/>
+                                  </p:stCondLst>
+                                  <p:childTnLst>
+                                    <p:set>
+                                      <p:cBhvr>
+                                        <p:cTn id="9" dur="1" fill="hold">
+                                          <p:stCondLst>
+                                            <p:cond delay="0"/>
+                                          </p:stCondLst>
+                                        </p:cTn>
+                                        <p:tgtEl>
+                                          <p:spTgt spid="24"/>
+                                        </p:tgtEl>
+                                        <p:attrNameLst>
+                                          <p:attrName>style.visibility</p:attrName>
+                                        </p:attrNameLst>
+                                      </p:cBhvr>
+                                      <p:to>
+                                        <p:strVal val="visible"/>
+                                      </p:to>
+                                    </p:set>
+                                  </p:childTnLst>
+                                </p:cTn>
+                              </p:par>
+                            </p:childTnLst>
+                          </p:cTn>
+                        </p:par>
+                        <p:par>
+                          <p:cTn id="10" fill="hold">
+                            <p:stCondLst>
+                              <p:cond delay="500"/>
+                            </p:stCondLst>
+                            <p:childTnLst>
+                              <p:par>
+                                <p:cTn id="11" presetID="1" presetClass="entr" presetSubtype="0" fill="hold" grpId="0" nodeType="afterEffect">
+                                  <p:stCondLst>
+                                    <p:cond delay="0"/>
+                                  </p:stCondLst>
+                                  <p:childTnLst>
+                                    <p:set>
+                                      <p:cBhvr>
+                                        <p:cTn id="12" dur="1" fill="hold">
+                                          <p:stCondLst>
+                                            <p:cond delay="0"/>
+                                          </p:stCondLst>
+                                        </p:cTn>
+                                        <p:tgtEl>
+                                          <p:spTgt spid="2"/>
+                                        </p:tgtEl>
+                                        <p:attrNameLst>
+                                          <p:attrName>style.visibility</p:attrName>
+                                        </p:attrNameLst>
+                                      </p:cBhvr>
+                                      <p:to>
+                                        <p:strVal val="visible"/>
+                                      </p:to>
+                                    </p:set>
+                                  </p:childTnLst>
+                                </p:cTn>
+                              </p:par>
+                            </p:childTnLst>
+                          </p:cTn>
+                        </p:par>
+                        <p:par>
+                          <p:cTn id="13" fill="hold">
+                            <p:stCondLst>
+                              <p:cond delay="500"/>
+                            </p:stCondLst>
+                            <p:childTnLst>
+                              <p:par>
+                                <p:cTn id="14" presetID="1" presetClass="entr" presetSubtype="0" fill="hold" nodeType="afterEffect">
+                                  <p:stCondLst>
+                                    <p:cond delay="0"/>
+                                  </p:stCondLst>
+                                  <p:childTnLst>
+                                    <p:set>
+                                      <p:cBhvr>
+                                        <p:cTn id="15" dur="1" fill="hold">
+                                          <p:stCondLst>
+                                            <p:cond delay="0"/>
+                                          </p:stCondLst>
+                                        </p:cTn>
+                                        <p:tgtEl>
+                                          <p:spTgt spid="64"/>
+                                        </p:tgtEl>
+                                        <p:attrNameLst>
+                                          <p:attrName>style.visibility</p:attrName>
+                                        </p:attrNameLst>
+                                      </p:cBhvr>
+                                      <p:to>
+                                        <p:strVal val="visible"/>
+                                      </p:to>
+                                    </p:set>
+                                  </p:childTnLst>
+                                </p:cTn>
+                              </p:par>
+                            </p:childTnLst>
+                          </p:cTn>
+                        </p:par>
+                        <p:par>
+                          <p:cTn id="16" fill="hold">
+                            <p:stCondLst>
+                              <p:cond delay="500"/>
+                            </p:stCondLst>
+                            <p:childTnLst>
+                              <p:par>
+                                <p:cTn id="17" presetID="1" presetClass="entr" presetSubtype="0" fill="hold" nodeType="afterEffect">
+                                  <p:stCondLst>
+                                    <p:cond delay="0"/>
+                                  </p:stCondLst>
+                                  <p:childTnLst>
+                                    <p:set>
+                                      <p:cBhvr>
+                                        <p:cTn id="18" dur="1" fill="hold">
+                                          <p:stCondLst>
+                                            <p:cond delay="0"/>
+                                          </p:stCondLst>
+                                        </p:cTn>
+                                        <p:tgtEl>
+                                          <p:spTgt spid="67"/>
+                                        </p:tgtEl>
+                                        <p:attrNameLst>
+                                          <p:attrName>style.visibility</p:attrName>
+                                        </p:attrNameLst>
+                                      </p:cBhvr>
+                                      <p:to>
+                                        <p:strVal val="visible"/>
+                                      </p:to>
+                                    </p:set>
+                                  </p:childTnLst>
+                                </p:cTn>
+                              </p:par>
+                            </p:childTnLst>
+                          </p:cTn>
+                        </p:par>
+                      </p:childTnLst>
+                    </p:cTn>
+                  </p:par>
+                  <p:par>
+                    <p:cTn id="19" fill="hold">
+                      <p:stCondLst>
+                        <p:cond delay="indefinite"/>
+                      </p:stCondLst>
+                      <p:childTnLst>
+                        <p:par>
+                          <p:cTn id="20" fill="hold">
+                            <p:stCondLst>
+                              <p:cond delay="0"/>
+                            </p:stCondLst>
+                            <p:childTnLst>
+                              <p:par>
+                                <p:cTn id="21" presetID="1" presetClass="entr" presetSubtype="0" fill="hold" grpId="0" nodeType="clickEffect">
+                                  <p:stCondLst>
+                                    <p:cond delay="0"/>
+                                  </p:stCondLst>
+                                  <p:childTnLst>
+                                    <p:set>
+                                      <p:cBhvr>
+                                        <p:cTn id="22" dur="1" fill="hold">
+                                          <p:stCondLst>
+                                            <p:cond delay="0"/>
+                                          </p:stCondLst>
+                                        </p:cTn>
+                                        <p:tgtEl>
+                                          <p:spTgt spid="22">
+                                            <p:txEl>
+                                              <p:pRg st="1" end="1"/>
+                                            </p:txEl>
+                                          </p:spTgt>
+                                        </p:tgtEl>
+                                        <p:attrNameLst>
+                                          <p:attrName>style.visibility</p:attrName>
+                                        </p:attrNameLst>
+                                      </p:cBhvr>
+                                      <p:to>
+                                        <p:strVal val="visible"/>
+                                      </p:to>
+                                    </p:set>
+                                  </p:childTnLst>
+                                </p:cTn>
+                              </p:par>
+                              <p:par>
+                                <p:cTn id="23" presetID="1" presetClass="entr" presetSubtype="0" fill="hold" grpId="0" nodeType="withEffect">
+                                  <p:stCondLst>
+                                    <p:cond delay="0"/>
+                                  </p:stCondLst>
+                                  <p:childTnLst>
+                                    <p:set>
+                                      <p:cBhvr>
+                                        <p:cTn id="24" dur="1" fill="hold">
+                                          <p:stCondLst>
+                                            <p:cond delay="0"/>
+                                          </p:stCondLst>
+                                        </p:cTn>
+                                        <p:tgtEl>
+                                          <p:spTgt spid="33"/>
+                                        </p:tgtEl>
+                                        <p:attrNameLst>
+                                          <p:attrName>style.visibility</p:attrName>
+                                        </p:attrNameLst>
+                                      </p:cBhvr>
+                                      <p:to>
+                                        <p:strVal val="visible"/>
+                                      </p:to>
+                                    </p:set>
+                                  </p:childTnLst>
+                                </p:cTn>
+                              </p:par>
+                              <p:par>
+                                <p:cTn id="25" presetID="1" presetClass="entr" presetSubtype="0" fill="hold" nodeType="withEffect">
+                                  <p:stCondLst>
+                                    <p:cond delay="0"/>
+                                  </p:stCondLst>
+                                  <p:childTnLst>
+                                    <p:set>
+                                      <p:cBhvr>
+                                        <p:cTn id="26" dur="1" fill="hold">
+                                          <p:stCondLst>
+                                            <p:cond delay="0"/>
+                                          </p:stCondLst>
+                                        </p:cTn>
+                                        <p:tgtEl>
+                                          <p:spTgt spid="73"/>
+                                        </p:tgtEl>
+                                        <p:attrNameLst>
+                                          <p:attrName>style.visibility</p:attrName>
+                                        </p:attrNameLst>
+                                      </p:cBhvr>
+                                      <p:to>
+                                        <p:strVal val="visible"/>
+                                      </p:to>
+                                    </p:set>
+                                  </p:childTnLst>
+                                </p:cTn>
+                              </p:par>
+                              <p:par>
+                                <p:cTn id="27" presetID="1" presetClass="entr" presetSubtype="0" fill="hold" nodeType="withEffect">
+                                  <p:stCondLst>
+                                    <p:cond delay="0"/>
+                                  </p:stCondLst>
+                                  <p:childTnLst>
+                                    <p:set>
+                                      <p:cBhvr>
+                                        <p:cTn id="28" dur="1" fill="hold">
+                                          <p:stCondLst>
+                                            <p:cond delay="0"/>
+                                          </p:stCondLst>
+                                        </p:cTn>
+                                        <p:tgtEl>
+                                          <p:spTgt spid="59"/>
+                                        </p:tgtEl>
+                                        <p:attrNameLst>
+                                          <p:attrName>style.visibility</p:attrName>
+                                        </p:attrNameLst>
+                                      </p:cBhvr>
+                                      <p:to>
+                                        <p:strVal val="visible"/>
+                                      </p:to>
+                                    </p:set>
+                                  </p:childTnLst>
+                                </p:cTn>
+                              </p:par>
+                            </p:childTnLst>
+                          </p:cTn>
+                        </p:par>
+                      </p:childTnLst>
+                    </p:cTn>
+                  </p:par>
+                  <p:par>
+                    <p:cTn id="29" fill="hold">
+                      <p:stCondLst>
+                        <p:cond delay="indefinite"/>
+                      </p:stCondLst>
+                      <p:childTnLst>
+                        <p:par>
+                          <p:cTn id="30" fill="hold">
+                            <p:stCondLst>
+                              <p:cond delay="0"/>
+                            </p:stCondLst>
+                            <p:childTnLst>
+                              <p:par>
+                                <p:cTn id="31" presetID="1" presetClass="entr" presetSubtype="0" fill="hold" grpId="0" nodeType="clickEffect">
+                                  <p:stCondLst>
+                                    <p:cond delay="0"/>
+                                  </p:stCondLst>
+                                  <p:childTnLst>
+                                    <p:set>
+                                      <p:cBhvr>
+                                        <p:cTn id="32" dur="1" fill="hold">
+                                          <p:stCondLst>
+                                            <p:cond delay="0"/>
+                                          </p:stCondLst>
+                                        </p:cTn>
+                                        <p:tgtEl>
+                                          <p:spTgt spid="22">
+                                            <p:txEl>
+                                              <p:pRg st="2" end="2"/>
+                                            </p:txEl>
+                                          </p:spTgt>
+                                        </p:tgtEl>
+                                        <p:attrNameLst>
+                                          <p:attrName>style.visibility</p:attrName>
+                                        </p:attrNameLst>
+                                      </p:cBhvr>
+                                      <p:to>
+                                        <p:strVal val="visible"/>
+                                      </p:to>
+                                    </p:set>
+                                  </p:childTnLst>
+                                </p:cTn>
+                              </p:par>
+                              <p:par>
+                                <p:cTn id="33" presetID="1" presetClass="entr" presetSubtype="0" fill="hold" nodeType="withEffect">
+                                  <p:stCondLst>
+                                    <p:cond delay="0"/>
+                                  </p:stCondLst>
+                                  <p:childTnLst>
+                                    <p:set>
+                                      <p:cBhvr>
+                                        <p:cTn id="34" dur="1" fill="hold">
+                                          <p:stCondLst>
+                                            <p:cond delay="0"/>
+                                          </p:stCondLst>
+                                        </p:cTn>
+                                        <p:tgtEl>
+                                          <p:spTgt spid="23"/>
+                                        </p:tgtEl>
+                                        <p:attrNameLst>
+                                          <p:attrName>style.visibility</p:attrName>
+                                        </p:attrNameLst>
+                                      </p:cBhvr>
+                                      <p:to>
+                                        <p:strVal val="visible"/>
+                                      </p:to>
+                                    </p:set>
+                                  </p:childTnLst>
+                                </p:cTn>
+                              </p:par>
+                              <p:par>
+                                <p:cTn id="35" presetID="1" presetClass="entr" presetSubtype="0" fill="hold" grpId="0" nodeType="withEffect">
+                                  <p:stCondLst>
+                                    <p:cond delay="0"/>
+                                  </p:stCondLst>
+                                  <p:childTnLst>
+                                    <p:set>
+                                      <p:cBhvr>
+                                        <p:cTn id="36" dur="1" fill="hold">
+                                          <p:stCondLst>
+                                            <p:cond delay="0"/>
+                                          </p:stCondLst>
+                                        </p:cTn>
+                                        <p:tgtEl>
+                                          <p:spTgt spid="36"/>
+                                        </p:tgtEl>
+                                        <p:attrNameLst>
+                                          <p:attrName>style.visibility</p:attrName>
+                                        </p:attrNameLst>
+                                      </p:cBhvr>
+                                      <p:to>
+                                        <p:strVal val="visible"/>
+                                      </p:to>
+                                    </p:set>
+                                  </p:childTnLst>
+                                </p:cTn>
+                              </p:par>
+                              <p:par>
+                                <p:cTn id="37" presetID="1" presetClass="entr" presetSubtype="0" fill="hold" nodeType="withEffect">
+                                  <p:stCondLst>
+                                    <p:cond delay="0"/>
+                                  </p:stCondLst>
+                                  <p:childTnLst>
+                                    <p:set>
+                                      <p:cBhvr>
+                                        <p:cTn id="38" dur="1" fill="hold">
+                                          <p:stCondLst>
+                                            <p:cond delay="0"/>
+                                          </p:stCondLst>
+                                        </p:cTn>
+                                        <p:tgtEl>
+                                          <p:spTgt spid="41"/>
+                                        </p:tgtEl>
+                                        <p:attrNameLst>
+                                          <p:attrName>style.visibility</p:attrName>
+                                        </p:attrNameLst>
+                                      </p:cBhvr>
+                                      <p:to>
+                                        <p:strVal val="visible"/>
+                                      </p:to>
+                                    </p:set>
+                                  </p:childTnLst>
+                                </p:cTn>
+                              </p:par>
+                              <p:par>
+                                <p:cTn id="39" presetID="1" presetClass="entr" presetSubtype="0" fill="hold" nodeType="withEffect">
+                                  <p:stCondLst>
+                                    <p:cond delay="0"/>
+                                  </p:stCondLst>
+                                  <p:childTnLst>
+                                    <p:set>
+                                      <p:cBhvr>
+                                        <p:cTn id="40" dur="1" fill="hold">
+                                          <p:stCondLst>
+                                            <p:cond delay="0"/>
+                                          </p:stCondLst>
+                                        </p:cTn>
+                                        <p:tgtEl>
+                                          <p:spTgt spid="47"/>
+                                        </p:tgtEl>
+                                        <p:attrNameLst>
+                                          <p:attrName>style.visibility</p:attrName>
+                                        </p:attrNameLst>
+                                      </p:cBhvr>
+                                      <p:to>
+                                        <p:strVal val="visible"/>
+                                      </p:to>
+                                    </p:set>
+                                  </p:childTnLst>
+                                </p:cTn>
+                              </p:par>
+                            </p:childTnLst>
+                          </p:cTn>
+                        </p:par>
+                        <p:par>
+                          <p:cTn id="41" fill="hold">
+                            <p:stCondLst>
+                              <p:cond delay="0"/>
+                            </p:stCondLst>
+                            <p:childTnLst>
+                              <p:par>
+                                <p:cTn id="42" presetID="1" presetClass="entr" presetSubtype="0" fill="hold" nodeType="afterEffect">
+                                  <p:stCondLst>
+                                    <p:cond delay="1500"/>
+                                  </p:stCondLst>
+                                  <p:childTnLst>
+                                    <p:set>
+                                      <p:cBhvr>
+                                        <p:cTn id="43" dur="1" fill="hold">
+                                          <p:stCondLst>
+                                            <p:cond delay="0"/>
+                                          </p:stCondLst>
+                                        </p:cTn>
+                                        <p:tgtEl>
+                                          <p:spTgt spid="25"/>
+                                        </p:tgtEl>
+                                        <p:attrNameLst>
+                                          <p:attrName>style.visibility</p:attrName>
+                                        </p:attrNameLst>
+                                      </p:cBhvr>
+                                      <p:to>
+                                        <p:strVal val="visible"/>
+                                      </p:to>
+                                    </p:set>
+                                  </p:childTnLst>
+                                </p:cTn>
+                              </p:par>
+                            </p:childTnLst>
+                          </p:cTn>
+                        </p:par>
+                        <p:par>
+                          <p:cTn id="44" fill="hold">
+                            <p:stCondLst>
+                              <p:cond delay="1500"/>
+                            </p:stCondLst>
+                            <p:childTnLst>
+                              <p:par>
+                                <p:cTn id="45" presetID="1" presetClass="entr" presetSubtype="0" fill="hold" nodeType="afterEffect">
+                                  <p:stCondLst>
+                                    <p:cond delay="500"/>
+                                  </p:stCondLst>
+                                  <p:childTnLst>
+                                    <p:set>
+                                      <p:cBhvr>
+                                        <p:cTn id="46" dur="1" fill="hold">
+                                          <p:stCondLst>
+                                            <p:cond delay="0"/>
+                                          </p:stCondLst>
+                                        </p:cTn>
+                                        <p:tgtEl>
+                                          <p:spTgt spid="27"/>
+                                        </p:tgtEl>
+                                        <p:attrNameLst>
+                                          <p:attrName>style.visibility</p:attrName>
+                                        </p:attrNameLst>
+                                      </p:cBhvr>
+                                      <p:to>
+                                        <p:strVal val="visible"/>
+                                      </p:to>
+                                    </p:set>
+                                  </p:childTnLst>
+                                </p:cTn>
+                              </p:par>
+                            </p:childTnLst>
+                          </p:cTn>
+                        </p:par>
+                        <p:par>
+                          <p:cTn id="47" fill="hold">
+                            <p:stCondLst>
+                              <p:cond delay="2000"/>
+                            </p:stCondLst>
+                            <p:childTnLst>
+                              <p:par>
+                                <p:cTn id="48" presetID="1" presetClass="entr" presetSubtype="0" fill="hold" nodeType="afterEffect">
+                                  <p:stCondLst>
+                                    <p:cond delay="500"/>
+                                  </p:stCondLst>
+                                  <p:childTnLst>
+                                    <p:set>
+                                      <p:cBhvr>
+                                        <p:cTn id="49" dur="1" fill="hold">
+                                          <p:stCondLst>
+                                            <p:cond delay="0"/>
+                                          </p:stCondLst>
+                                        </p:cTn>
+                                        <p:tgtEl>
+                                          <p:spTgt spid="28"/>
+                                        </p:tgtEl>
+                                        <p:attrNameLst>
+                                          <p:attrName>style.visibility</p:attrName>
+                                        </p:attrNameLst>
+                                      </p:cBhvr>
+                                      <p:to>
+                                        <p:strVal val="visible"/>
+                                      </p:to>
+                                    </p:set>
+                                  </p:childTnLst>
+                                </p:cTn>
+                              </p:par>
+                            </p:childTnLst>
+                          </p:cTn>
+                        </p:par>
+                        <p:par>
+                          <p:cTn id="50" fill="hold">
+                            <p:stCondLst>
+                              <p:cond delay="2500"/>
+                            </p:stCondLst>
+                            <p:childTnLst>
+                              <p:par>
+                                <p:cTn id="51" presetID="1" presetClass="entr" presetSubtype="0" fill="hold" nodeType="afterEffect">
+                                  <p:stCondLst>
+                                    <p:cond delay="500"/>
+                                  </p:stCondLst>
+                                  <p:childTnLst>
+                                    <p:set>
+                                      <p:cBhvr>
+                                        <p:cTn id="52" dur="1" fill="hold">
+                                          <p:stCondLst>
+                                            <p:cond delay="0"/>
+                                          </p:stCondLst>
+                                        </p:cTn>
+                                        <p:tgtEl>
+                                          <p:spTgt spid="29"/>
+                                        </p:tgtEl>
+                                        <p:attrNameLst>
+                                          <p:attrName>style.visibility</p:attrName>
+                                        </p:attrNameLst>
+                                      </p:cBhvr>
+                                      <p:to>
+                                        <p:strVal val="visible"/>
+                                      </p:to>
+                                    </p:set>
+                                  </p:childTnLst>
+                                </p:cTn>
+                              </p:par>
+                            </p:childTnLst>
+                          </p:cTn>
+                        </p:par>
+                        <p:par>
+                          <p:cTn id="53" fill="hold">
+                            <p:stCondLst>
+                              <p:cond delay="3000"/>
+                            </p:stCondLst>
+                            <p:childTnLst>
+                              <p:par>
+                                <p:cTn id="54" presetID="1" presetClass="entr" presetSubtype="0" fill="hold" nodeType="afterEffect">
+                                  <p:stCondLst>
+                                    <p:cond delay="500"/>
+                                  </p:stCondLst>
+                                  <p:childTnLst>
+                                    <p:set>
+                                      <p:cBhvr>
+                                        <p:cTn id="55" dur="1" fill="hold">
+                                          <p:stCondLst>
+                                            <p:cond delay="0"/>
+                                          </p:stCondLst>
+                                        </p:cTn>
+                                        <p:tgtEl>
+                                          <p:spTgt spid="30"/>
+                                        </p:tgtEl>
+                                        <p:attrNameLst>
+                                          <p:attrName>style.visibility</p:attrName>
+                                        </p:attrNameLst>
+                                      </p:cBhvr>
+                                      <p:to>
+                                        <p:strVal val="visible"/>
+                                      </p:to>
+                                    </p:set>
+                                  </p:childTnLst>
+                                </p:cTn>
+                              </p:par>
+                            </p:childTnLst>
+                          </p:cTn>
+                        </p:par>
+                        <p:par>
+                          <p:cTn id="56" fill="hold">
+                            <p:stCondLst>
+                              <p:cond delay="3500"/>
+                            </p:stCondLst>
+                            <p:childTnLst>
+                              <p:par>
+                                <p:cTn id="57" presetID="1" presetClass="entr" presetSubtype="0" fill="hold" nodeType="afterEffect">
+                                  <p:stCondLst>
+                                    <p:cond delay="500"/>
+                                  </p:stCondLst>
+                                  <p:childTnLst>
+                                    <p:set>
+                                      <p:cBhvr>
+                                        <p:cTn id="58" dur="1" fill="hold">
+                                          <p:stCondLst>
+                                            <p:cond delay="0"/>
+                                          </p:stCondLst>
+                                        </p:cTn>
+                                        <p:tgtEl>
+                                          <p:spTgt spid="31"/>
+                                        </p:tgtEl>
+                                        <p:attrNameLst>
+                                          <p:attrName>style.visibility</p:attrName>
+                                        </p:attrNameLst>
+                                      </p:cBhvr>
+                                      <p:to>
+                                        <p:strVal val="visible"/>
+                                      </p:to>
+                                    </p:set>
+                                  </p:childTnLst>
+                                </p:cTn>
+                              </p:par>
+                            </p:childTnLst>
+                          </p:cTn>
+                        </p:par>
+                        <p:par>
+                          <p:cTn id="59" fill="hold">
+                            <p:stCondLst>
+                              <p:cond delay="4000"/>
+                            </p:stCondLst>
+                            <p:childTnLst>
+                              <p:par>
+                                <p:cTn id="60" presetID="1" presetClass="entr" presetSubtype="0" fill="hold" nodeType="afterEffect">
+                                  <p:stCondLst>
+                                    <p:cond delay="500"/>
+                                  </p:stCondLst>
+                                  <p:childTnLst>
+                                    <p:set>
+                                      <p:cBhvr>
+                                        <p:cTn id="61" dur="1" fill="hold">
+                                          <p:stCondLst>
+                                            <p:cond delay="0"/>
+                                          </p:stCondLst>
+                                        </p:cTn>
+                                        <p:tgtEl>
+                                          <p:spTgt spid="32"/>
+                                        </p:tgtEl>
+                                        <p:attrNameLst>
+                                          <p:attrName>style.visibility</p:attrName>
+                                        </p:attrNameLst>
+                                      </p:cBhvr>
+                                      <p:to>
+                                        <p:strVal val="visible"/>
+                                      </p:to>
+                                    </p:set>
+                                  </p:childTnLst>
+                                </p:cTn>
+                              </p:par>
+                            </p:childTnLst>
+                          </p:cTn>
+                        </p:par>
+                      </p:childTnLst>
+                    </p:cTn>
+                  </p:par>
+                  <p:par>
+                    <p:cTn id="62" fill="hold">
+                      <p:stCondLst>
+                        <p:cond delay="indefinite"/>
+                      </p:stCondLst>
+                      <p:childTnLst>
+                        <p:par>
+                          <p:cTn id="63" fill="hold">
+                            <p:stCondLst>
+                              <p:cond delay="0"/>
+                            </p:stCondLst>
+                            <p:childTnLst>
+                              <p:par>
+                                <p:cTn id="64" presetID="1" presetClass="entr" presetSubtype="0" fill="hold" grpId="0" nodeType="clickEffect">
+                                  <p:stCondLst>
+                                    <p:cond delay="0"/>
+                                  </p:stCondLst>
+                                  <p:childTnLst>
+                                    <p:set>
+                                      <p:cBhvr>
+                                        <p:cTn id="65" dur="1" fill="hold">
+                                          <p:stCondLst>
+                                            <p:cond delay="0"/>
+                                          </p:stCondLst>
+                                        </p:cTn>
+                                        <p:tgtEl>
+                                          <p:spTgt spid="22">
+                                            <p:txEl>
+                                              <p:pRg st="3" end="3"/>
+                                            </p:txEl>
+                                          </p:spTgt>
+                                        </p:tgtEl>
+                                        <p:attrNameLst>
+                                          <p:attrName>style.visibility</p:attrName>
+                                        </p:attrNameLst>
+                                      </p:cBhvr>
+                                      <p:to>
+                                        <p:strVal val="visible"/>
+                                      </p:to>
+                                    </p:set>
+                                  </p:childTnLst>
+                                </p:cTn>
+                              </p:par>
+                              <p:par>
+                                <p:cTn id="66" presetID="1" presetClass="entr" presetSubtype="0" fill="hold" nodeType="withEffect">
+                                  <p:stCondLst>
+                                    <p:cond delay="0"/>
+                                  </p:stCondLst>
+                                  <p:childTnLst>
+                                    <p:set>
+                                      <p:cBhvr>
+                                        <p:cTn id="67" dur="1" fill="hold">
+                                          <p:stCondLst>
+                                            <p:cond delay="0"/>
+                                          </p:stCondLst>
+                                        </p:cTn>
+                                        <p:tgtEl>
+                                          <p:spTgt spid="44"/>
+                                        </p:tgtEl>
+                                        <p:attrNameLst>
+                                          <p:attrName>style.visibility</p:attrName>
+                                        </p:attrNameLst>
+                                      </p:cBhvr>
+                                      <p:to>
+                                        <p:strVal val="visible"/>
+                                      </p:to>
+                                    </p:set>
+                                  </p:childTnLst>
+                                </p:cTn>
+                              </p:par>
+                              <p:par>
+                                <p:cTn id="68" presetID="1" presetClass="entr" presetSubtype="0" fill="hold" nodeType="withEffect">
+                                  <p:stCondLst>
+                                    <p:cond delay="0"/>
+                                  </p:stCondLst>
+                                  <p:childTnLst>
+                                    <p:set>
+                                      <p:cBhvr>
+                                        <p:cTn id="69" dur="1" fill="hold">
+                                          <p:stCondLst>
+                                            <p:cond delay="0"/>
+                                          </p:stCondLst>
+                                        </p:cTn>
+                                        <p:tgtEl>
+                                          <p:spTgt spid="38"/>
+                                        </p:tgtEl>
+                                        <p:attrNameLst>
+                                          <p:attrName>style.visibility</p:attrName>
+                                        </p:attrNameLst>
+                                      </p:cBhvr>
+                                      <p:to>
+                                        <p:strVal val="visible"/>
+                                      </p:to>
+                                    </p:set>
+                                  </p:childTnLst>
+                                </p:cTn>
+                              </p:par>
+                              <p:par>
+                                <p:cTn id="70" presetID="1" presetClass="entr" presetSubtype="0" fill="hold" grpId="0" nodeType="withEffect">
+                                  <p:stCondLst>
+                                    <p:cond delay="0"/>
+                                  </p:stCondLst>
+                                  <p:childTnLst>
+                                    <p:set>
+                                      <p:cBhvr>
+                                        <p:cTn id="71" dur="1" fill="hold">
+                                          <p:stCondLst>
+                                            <p:cond delay="0"/>
+                                          </p:stCondLst>
+                                        </p:cTn>
+                                        <p:tgtEl>
+                                          <p:spTgt spid="37"/>
+                                        </p:tgtEl>
+                                        <p:attrNameLst>
+                                          <p:attrName>style.visibility</p:attrName>
+                                        </p:attrNameLst>
+                                      </p:cBhvr>
+                                      <p:to>
+                                        <p:strVal val="visible"/>
+                                      </p:to>
+                                    </p:set>
+                                  </p:childTnLst>
+                                </p:cTn>
+                              </p:par>
+                              <p:par>
+                                <p:cTn id="72" presetID="1" presetClass="entr" presetSubtype="0" fill="hold" nodeType="withEffect">
+                                  <p:stCondLst>
+                                    <p:cond delay="0"/>
+                                  </p:stCondLst>
+                                  <p:childTnLst>
+                                    <p:set>
+                                      <p:cBhvr>
+                                        <p:cTn id="73" dur="1" fill="hold">
+                                          <p:stCondLst>
+                                            <p:cond delay="0"/>
+                                          </p:stCondLst>
+                                        </p:cTn>
+                                        <p:tgtEl>
+                                          <p:spTgt spid="34"/>
+                                        </p:tgtEl>
+                                        <p:attrNameLst>
+                                          <p:attrName>style.visibility</p:attrName>
+                                        </p:attrNameLst>
+                                      </p:cBhvr>
+                                      <p:to>
+                                        <p:strVal val="visible"/>
+                                      </p:to>
+                                    </p:set>
+                                  </p:childTnLst>
+                                </p:cTn>
+                              </p:par>
+                            </p:childTnLst>
+                          </p:cTn>
+                        </p:par>
+                      </p:childTnLst>
+                    </p:cTn>
+                  </p:par>
+                  <p:par>
+                    <p:cTn id="74" fill="hold">
+                      <p:stCondLst>
+                        <p:cond delay="indefinite"/>
+                      </p:stCondLst>
+                      <p:childTnLst>
+                        <p:par>
+                          <p:cTn id="75" fill="hold">
+                            <p:stCondLst>
+                              <p:cond delay="0"/>
+                            </p:stCondLst>
+                            <p:childTnLst>
+                              <p:par>
+                                <p:cTn id="76" presetID="1" presetClass="entr" presetSubtype="0" fill="hold" grpId="0" nodeType="clickEffect">
+                                  <p:stCondLst>
+                                    <p:cond delay="0"/>
+                                  </p:stCondLst>
+                                  <p:childTnLst>
+                                    <p:set>
+                                      <p:cBhvr>
+                                        <p:cTn id="77" dur="1" fill="hold">
+                                          <p:stCondLst>
+                                            <p:cond delay="0"/>
+                                          </p:stCondLst>
+                                        </p:cTn>
+                                        <p:tgtEl>
+                                          <p:spTgt spid="22">
+                                            <p:txEl>
+                                              <p:pRg st="4" end="4"/>
+                                            </p:txEl>
+                                          </p:spTgt>
+                                        </p:tgtEl>
+                                        <p:attrNameLst>
+                                          <p:attrName>style.visibility</p:attrName>
+                                        </p:attrNameLst>
+                                      </p:cBhvr>
+                                      <p:to>
+                                        <p:strVal val="visible"/>
+                                      </p:to>
+                                    </p:set>
+                                  </p:childTnLst>
+                                </p:cTn>
+                              </p:par>
+                              <p:par>
+                                <p:cTn id="78" presetID="1" presetClass="entr" presetSubtype="0" fill="hold" nodeType="withEffect">
+                                  <p:stCondLst>
+                                    <p:cond delay="0"/>
+                                  </p:stCondLst>
+                                  <p:childTnLst>
+                                    <p:set>
+                                      <p:cBhvr>
+                                        <p:cTn id="79" dur="1" fill="hold">
+                                          <p:stCondLst>
+                                            <p:cond delay="0"/>
+                                          </p:stCondLst>
+                                        </p:cTn>
+                                        <p:tgtEl>
+                                          <p:spTgt spid="86"/>
+                                        </p:tgtEl>
+                                        <p:attrNameLst>
+                                          <p:attrName>style.visibility</p:attrName>
+                                        </p:attrNameLst>
+                                      </p:cBhvr>
+                                      <p:to>
+                                        <p:strVal val="visible"/>
+                                      </p:to>
+                                    </p:set>
+                                  </p:childTnLst>
+                                </p:cTn>
+                              </p:par>
+                              <p:par>
+                                <p:cTn id="80" presetID="1" presetClass="entr" presetSubtype="0" fill="hold" grpId="0" nodeType="withEffect">
+                                  <p:stCondLst>
+                                    <p:cond delay="0"/>
+                                  </p:stCondLst>
+                                  <p:childTnLst>
+                                    <p:set>
+                                      <p:cBhvr>
+                                        <p:cTn id="81" dur="1" fill="hold">
+                                          <p:stCondLst>
+                                            <p:cond delay="0"/>
+                                          </p:stCondLst>
+                                        </p:cTn>
+                                        <p:tgtEl>
+                                          <p:spTgt spid="39"/>
+                                        </p:tgtEl>
+                                        <p:attrNameLst>
+                                          <p:attrName>style.visibility</p:attrName>
+                                        </p:attrNameLst>
+                                      </p:cBhvr>
+                                      <p:to>
+                                        <p:strVal val="visible"/>
+                                      </p:to>
+                                    </p:set>
+                                  </p:childTnLst>
+                                </p:cTn>
+                              </p:par>
+                              <p:par>
+                                <p:cTn id="82" presetID="1" presetClass="entr" presetSubtype="0" fill="hold" nodeType="withEffect">
+                                  <p:stCondLst>
+                                    <p:cond delay="0"/>
+                                  </p:stCondLst>
+                                  <p:childTnLst>
+                                    <p:set>
+                                      <p:cBhvr>
+                                        <p:cTn id="83" dur="1" fill="hold">
+                                          <p:stCondLst>
+                                            <p:cond delay="0"/>
+                                          </p:stCondLst>
+                                        </p:cTn>
+                                        <p:tgtEl>
+                                          <p:spTgt spid="60"/>
+                                        </p:tgtEl>
+                                        <p:attrNameLst>
+                                          <p:attrName>style.visibility</p:attrName>
+                                        </p:attrNameLst>
+                                      </p:cBhvr>
+                                      <p:to>
+                                        <p:strVal val="visible"/>
+                                      </p:to>
+                                    </p:set>
+                                  </p:childTnLst>
+                                </p:cTn>
+                              </p:par>
+                            </p:childTnLst>
+                          </p:cTn>
+                        </p:par>
+                      </p:childTnLst>
+                    </p:cTn>
+                  </p:par>
+                  <p:par>
+                    <p:cTn id="84" fill="hold">
+                      <p:stCondLst>
+                        <p:cond delay="indefinite"/>
+                      </p:stCondLst>
+                      <p:childTnLst>
+                        <p:par>
+                          <p:cTn id="85" fill="hold">
+                            <p:stCondLst>
+                              <p:cond delay="0"/>
+                            </p:stCondLst>
+                            <p:childTnLst>
+                              <p:par>
+                                <p:cTn id="86" presetID="1" presetClass="entr" presetSubtype="0" fill="hold" grpId="0" nodeType="clickEffect">
+                                  <p:stCondLst>
+                                    <p:cond delay="0"/>
+                                  </p:stCondLst>
+                                  <p:childTnLst>
+                                    <p:set>
+                                      <p:cBhvr>
+                                        <p:cTn id="87" dur="1" fill="hold">
+                                          <p:stCondLst>
+                                            <p:cond delay="0"/>
+                                          </p:stCondLst>
+                                        </p:cTn>
+                                        <p:tgtEl>
+                                          <p:spTgt spid="22">
+                                            <p:txEl>
+                                              <p:pRg st="5" end="5"/>
+                                            </p:txEl>
+                                          </p:spTgt>
+                                        </p:tgtEl>
+                                        <p:attrNameLst>
+                                          <p:attrName>style.visibility</p:attrName>
+                                        </p:attrNameLst>
+                                      </p:cBhvr>
+                                      <p:to>
+                                        <p:strVal val="visible"/>
+                                      </p:to>
+                                    </p:set>
+                                  </p:childTnLst>
+                                </p:cTn>
+                              </p:par>
+                              <p:par>
+                                <p:cTn id="88" presetID="1" presetClass="entr" presetSubtype="0" fill="hold" grpId="0" nodeType="withEffect">
+                                  <p:stCondLst>
+                                    <p:cond delay="0"/>
+                                  </p:stCondLst>
+                                  <p:childTnLst>
+                                    <p:set>
+                                      <p:cBhvr>
+                                        <p:cTn id="89" dur="1" fill="hold">
+                                          <p:stCondLst>
+                                            <p:cond delay="0"/>
+                                          </p:stCondLst>
+                                        </p:cTn>
+                                        <p:tgtEl>
+                                          <p:spTgt spid="40"/>
+                                        </p:tgtEl>
+                                        <p:attrNameLst>
+                                          <p:attrName>style.visibility</p:attrName>
+                                        </p:attrNameLst>
+                                      </p:cBhvr>
+                                      <p:to>
+                                        <p:strVal val="visible"/>
+                                      </p:to>
+                                    </p:set>
+                                  </p:childTnLst>
+                                </p:cTn>
+                              </p:par>
+                              <p:par>
+                                <p:cTn id="90" presetID="1" presetClass="entr" presetSubtype="0" fill="hold" nodeType="withEffect">
+                                  <p:stCondLst>
+                                    <p:cond delay="0"/>
+                                  </p:stCondLst>
+                                  <p:childTnLst>
+                                    <p:set>
+                                      <p:cBhvr>
+                                        <p:cTn id="91" dur="1" fill="hold">
+                                          <p:stCondLst>
+                                            <p:cond delay="0"/>
+                                          </p:stCondLst>
+                                        </p:cTn>
+                                        <p:tgtEl>
+                                          <p:spTgt spid="55"/>
+                                        </p:tgtEl>
+                                        <p:attrNameLst>
+                                          <p:attrName>style.visibility</p:attrName>
+                                        </p:attrNameLst>
+                                      </p:cBhvr>
+                                      <p:to>
+                                        <p:strVal val="visible"/>
+                                      </p:to>
+                                    </p:set>
+                                  </p:childTnLst>
+                                </p:cTn>
+                              </p:par>
+                              <p:par>
+                                <p:cTn id="92" presetID="1" presetClass="entr" presetSubtype="0" fill="hold" nodeType="withEffect">
+                                  <p:stCondLst>
+                                    <p:cond delay="0"/>
+                                  </p:stCondLst>
+                                  <p:childTnLst>
+                                    <p:set>
+                                      <p:cBhvr>
+                                        <p:cTn id="93" dur="1" fill="hold">
+                                          <p:stCondLst>
+                                            <p:cond delay="0"/>
+                                          </p:stCondLst>
+                                        </p:cTn>
+                                        <p:tgtEl>
+                                          <p:spTgt spid="35"/>
+                                        </p:tgtEl>
+                                        <p:attrNameLst>
+                                          <p:attrName>style.visibility</p:attrName>
+                                        </p:attrNameLst>
+                                      </p:cBhvr>
+                                      <p:to>
+                                        <p:strVal val="visible"/>
+                                      </p:to>
+                                    </p:set>
+                                  </p:childTnLst>
+                                </p:cTn>
+                              </p:par>
+                            </p:childTnLst>
+                          </p:cTn>
+                        </p:par>
+                      </p:childTnLst>
+                    </p:cTn>
+                  </p:par>
+                  <p:par>
+                    <p:cTn id="94" fill="hold">
+                      <p:stCondLst>
+                        <p:cond delay="indefinite"/>
+                      </p:stCondLst>
+                      <p:childTnLst>
+                        <p:par>
+                          <p:cTn id="95" fill="hold">
+                            <p:stCondLst>
+                              <p:cond delay="0"/>
+                            </p:stCondLst>
+                            <p:childTnLst>
+                              <p:par>
+                                <p:cTn id="96" presetID="1" presetClass="entr" presetSubtype="0" fill="hold" grpId="0" nodeType="clickEffect">
+                                  <p:stCondLst>
+                                    <p:cond delay="0"/>
+                                  </p:stCondLst>
+                                  <p:childTnLst>
+                                    <p:set>
+                                      <p:cBhvr>
+                                        <p:cTn id="97" dur="1" fill="hold">
+                                          <p:stCondLst>
+                                            <p:cond delay="0"/>
+                                          </p:stCondLst>
+                                        </p:cTn>
+                                        <p:tgtEl>
+                                          <p:spTgt spid="22">
+                                            <p:txEl>
+                                              <p:pRg st="6" end="6"/>
+                                            </p:txEl>
+                                          </p:spTgt>
+                                        </p:tgtEl>
+                                        <p:attrNameLst>
+                                          <p:attrName>style.visibility</p:attrName>
+                                        </p:attrNameLst>
+                                      </p:cBhvr>
+                                      <p:to>
+                                        <p:strVal val="visible"/>
+                                      </p:to>
+                                    </p:set>
+                                  </p:childTnLst>
+                                </p:cTn>
+                              </p:par>
+                              <p:par>
+                                <p:cTn id="98" presetID="1" presetClass="entr" presetSubtype="0" fill="hold" grpId="0" nodeType="withEffect">
+                                  <p:stCondLst>
+                                    <p:cond delay="0"/>
+                                  </p:stCondLst>
+                                  <p:childTnLst>
+                                    <p:set>
+                                      <p:cBhvr>
+                                        <p:cTn id="99" dur="1" fill="hold">
+                                          <p:stCondLst>
+                                            <p:cond delay="0"/>
+                                          </p:stCondLst>
+                                        </p:cTn>
+                                        <p:tgtEl>
+                                          <p:spTgt spid="43"/>
+                                        </p:tgtEl>
+                                        <p:attrNameLst>
+                                          <p:attrName>style.visibility</p:attrName>
+                                        </p:attrNameLst>
+                                      </p:cBhvr>
+                                      <p:to>
+                                        <p:strVal val="visible"/>
+                                      </p:to>
+                                    </p:set>
+                                  </p:childTnLst>
+                                </p:cTn>
+                              </p:par>
+                              <p:par>
+                                <p:cTn id="100" presetID="1" presetClass="entr" presetSubtype="0" fill="hold" nodeType="withEffect">
+                                  <p:stCondLst>
+                                    <p:cond delay="0"/>
+                                  </p:stCondLst>
+                                  <p:childTnLst>
+                                    <p:set>
+                                      <p:cBhvr>
+                                        <p:cTn id="101" dur="1" fill="hold">
+                                          <p:stCondLst>
+                                            <p:cond delay="0"/>
+                                          </p:stCondLst>
+                                        </p:cTn>
+                                        <p:tgtEl>
+                                          <p:spTgt spid="79"/>
+                                        </p:tgtEl>
+                                        <p:attrNameLst>
+                                          <p:attrName>style.visibility</p:attrName>
+                                        </p:attrNameLst>
+                                      </p:cBhvr>
+                                      <p:to>
+                                        <p:strVal val="visible"/>
+                                      </p:to>
+                                    </p:set>
+                                  </p:childTnLst>
+                                </p:cTn>
+                              </p:par>
+                            </p:childTnLst>
+                          </p:cTn>
+                        </p:par>
+                      </p:childTnLst>
+                    </p:cTn>
+                  </p:par>
+                  <p:par>
+                    <p:cTn id="102" fill="hold">
+                      <p:stCondLst>
+                        <p:cond delay="indefinite"/>
+                      </p:stCondLst>
+                      <p:childTnLst>
+                        <p:par>
+                          <p:cTn id="103" fill="hold">
+                            <p:stCondLst>
+                              <p:cond delay="0"/>
+                            </p:stCondLst>
+                            <p:childTnLst>
+                              <p:par>
+                                <p:cTn id="104" presetID="1" presetClass="entr" presetSubtype="0" fill="hold" nodeType="clickEffect">
+                                  <p:stCondLst>
+                                    <p:cond delay="0"/>
+                                  </p:stCondLst>
+                                  <p:childTnLst>
+                                    <p:set>
+                                      <p:cBhvr>
+                                        <p:cTn id="105" dur="1" fill="hold">
+                                          <p:stCondLst>
+                                            <p:cond delay="0"/>
+                                          </p:stCondLst>
+                                        </p:cTn>
+                                        <p:tgtEl>
+                                          <p:spTgt spid="80"/>
+                                        </p:tgtEl>
+                                        <p:attrNameLst>
+                                          <p:attrName>style.visibility</p:attrName>
+                                        </p:attrNameLst>
+                                      </p:cBhvr>
+                                      <p:to>
+                                        <p:strVal val="visible"/>
+                                      </p:to>
+                                    </p:set>
+                                  </p:childTnLst>
+                                </p:cTn>
+                              </p:par>
+                            </p:childTnLst>
+                          </p:cTn>
+                        </p:par>
+                      </p:childTnLst>
+                    </p:cTn>
+                  </p:par>
+                  <p:par>
+                    <p:cTn id="106" fill="hold">
+                      <p:stCondLst>
+                        <p:cond delay="indefinite"/>
+                      </p:stCondLst>
+                      <p:childTnLst>
+                        <p:par>
+                          <p:cTn id="107" fill="hold">
+                            <p:stCondLst>
+                              <p:cond delay="0"/>
+                            </p:stCondLst>
+                            <p:childTnLst>
+                              <p:par>
+                                <p:cTn id="108" presetID="1" presetClass="entr" presetSubtype="0" fill="hold" nodeType="clickEffect">
+                                  <p:stCondLst>
+                                    <p:cond delay="0"/>
+                                  </p:stCondLst>
+                                  <p:childTnLst>
+                                    <p:set>
+                                      <p:cBhvr>
+                                        <p:cTn id="109" dur="1" fill="hold">
+                                          <p:stCondLst>
+                                            <p:cond delay="0"/>
+                                          </p:stCondLst>
+                                        </p:cTn>
+                                        <p:tgtEl>
+                                          <p:spTgt spid="81"/>
+                                        </p:tgtEl>
+                                        <p:attrNameLst>
+                                          <p:attrName>style.visibility</p:attrName>
+                                        </p:attrNameLst>
+                                      </p:cBhvr>
+                                      <p:to>
+                                        <p:strVal val="visible"/>
+                                      </p:to>
+                                    </p:set>
+                                  </p:childTnLst>
+                                </p:cTn>
+                              </p:par>
+                            </p:childTnLst>
+                          </p:cTn>
+                        </p:par>
+                      </p:childTnLst>
+                    </p:cTn>
+                  </p:par>
+                  <p:par>
+                    <p:cTn id="110" fill="hold">
+                      <p:stCondLst>
+                        <p:cond delay="indefinite"/>
+                      </p:stCondLst>
+                      <p:childTnLst>
+                        <p:par>
+                          <p:cTn id="111" fill="hold">
+                            <p:stCondLst>
+                              <p:cond delay="0"/>
+                            </p:stCondLst>
+                            <p:childTnLst>
+                              <p:par>
+                                <p:cTn id="112" presetID="1" presetClass="entr" presetSubtype="0" fill="hold" nodeType="clickEffect">
+                                  <p:stCondLst>
+                                    <p:cond delay="0"/>
+                                  </p:stCondLst>
+                                  <p:childTnLst>
+                                    <p:set>
+                                      <p:cBhvr>
+                                        <p:cTn id="113" dur="1" fill="hold">
+                                          <p:stCondLst>
+                                            <p:cond delay="0"/>
+                                          </p:stCondLst>
+                                        </p:cTn>
+                                        <p:tgtEl>
+                                          <p:spTgt spid="82"/>
+                                        </p:tgtEl>
+                                        <p:attrNameLst>
+                                          <p:attrName>style.visibility</p:attrName>
+                                        </p:attrNameLst>
+                                      </p:cBhvr>
+                                      <p:to>
+                                        <p:strVal val="visible"/>
+                                      </p:to>
+                                    </p:set>
+                                  </p:childTnLst>
+                                </p:cTn>
+                              </p:par>
+                            </p:childTnLst>
+                          </p:cTn>
+                        </p:par>
+                      </p:childTnLst>
+                    </p:cTn>
+                  </p:par>
+                  <p:par>
+                    <p:cTn id="114" fill="hold">
+                      <p:stCondLst>
+                        <p:cond delay="indefinite"/>
+                      </p:stCondLst>
+                      <p:childTnLst>
+                        <p:par>
+                          <p:cTn id="115" fill="hold">
+                            <p:stCondLst>
+                              <p:cond delay="0"/>
+                            </p:stCondLst>
+                            <p:childTnLst>
+                              <p:par>
+                                <p:cTn id="116" presetID="1" presetClass="entr" presetSubtype="0" fill="hold" grpId="0" nodeType="clickEffect">
+                                  <p:stCondLst>
+                                    <p:cond delay="0"/>
+                                  </p:stCondLst>
+                                  <p:childTnLst>
+                                    <p:set>
+                                      <p:cBhvr>
+                                        <p:cTn id="117" dur="1" fill="hold">
+                                          <p:stCondLst>
+                                            <p:cond delay="0"/>
+                                          </p:stCondLst>
+                                        </p:cTn>
+                                        <p:tgtEl>
+                                          <p:spTgt spid="22">
+                                            <p:txEl>
+                                              <p:pRg st="7" end="7"/>
+                                            </p:txEl>
+                                          </p:spTgt>
+                                        </p:tgtEl>
+                                        <p:attrNameLst>
+                                          <p:attrName>style.visibility</p:attrName>
+                                        </p:attrNameLst>
+                                      </p:cBhvr>
+                                      <p:to>
+                                        <p:strVal val="visible"/>
+                                      </p:to>
+                                    </p:set>
+                                  </p:childTnLst>
+                                </p:cTn>
+                              </p:par>
+                              <p:par>
+                                <p:cTn id="118" presetID="1" presetClass="entr" presetSubtype="0" fill="hold" nodeType="withEffect">
+                                  <p:stCondLst>
+                                    <p:cond delay="0"/>
+                                  </p:stCondLst>
+                                  <p:childTnLst>
+                                    <p:set>
+                                      <p:cBhvr>
+                                        <p:cTn id="119" dur="1" fill="hold">
+                                          <p:stCondLst>
+                                            <p:cond delay="0"/>
+                                          </p:stCondLst>
+                                        </p:cTn>
+                                        <p:tgtEl>
+                                          <p:spTgt spid="52"/>
+                                        </p:tgtEl>
+                                        <p:attrNameLst>
+                                          <p:attrName>style.visibility</p:attrName>
+                                        </p:attrNameLst>
+                                      </p:cBhvr>
+                                      <p:to>
+                                        <p:strVal val="visible"/>
+                                      </p:to>
+                                    </p:set>
+                                  </p:childTnLst>
+                                </p:cTn>
+                              </p:par>
+                              <p:par>
+                                <p:cTn id="120" presetID="1" presetClass="entr" presetSubtype="0" fill="hold" grpId="0" nodeType="withEffect">
+                                  <p:stCondLst>
+                                    <p:cond delay="0"/>
+                                  </p:stCondLst>
+                                  <p:childTnLst>
+                                    <p:set>
+                                      <p:cBhvr>
+                                        <p:cTn id="121" dur="1" fill="hold">
+                                          <p:stCondLst>
+                                            <p:cond delay="0"/>
+                                          </p:stCondLst>
+                                        </p:cTn>
+                                        <p:tgtEl>
+                                          <p:spTgt spid="42"/>
+                                        </p:tgtEl>
+                                        <p:attrNameLst>
+                                          <p:attrName>style.visibility</p:attrName>
+                                        </p:attrNameLst>
+                                      </p:cBhvr>
+                                      <p:to>
+                                        <p:strVal val="visible"/>
+                                      </p:to>
+                                    </p:set>
+                                  </p:childTnLst>
+                                </p:cTn>
+                              </p:par>
+                            </p:childTnLst>
+                          </p:cTn>
+                        </p:par>
+                      </p:childTnLst>
+                    </p:cTn>
+                  </p:par>
+                </p:childTnLst>
+              </p:cTn>
+              <p:prevCondLst>
+                <p:cond evt="onPrev" delay="0">
+                  <p:tgtEl>
+                    <p:sldTgt/>
+                  </p:tgtEl>
+                </p:cond>
+              </p:prevCondLst>
+              <p:nextCondLst>
+                <p:cond evt="onNext" delay="0">
+                  <p:tgtEl>
+                    <p:sldTgt/>
+                  </p:tgtEl>
+                </p:cond>
+              </p:nextCondLst>
+            </p:seq>
+          </p:childTnLst>
+        </p:cTn>
+      </p:par>
+    </p:tnLst>
+    <p:bldLst>
+      <p:bldP spid="22" grpId="0" uiExpand="1" build="p"/>
+      <p:bldP spid="2" grpId="0" animBg="1"/>
+      <p:bldP spid="33" grpId="0" animBg="1"/>
+      <p:bldP spid="36" grpId="0" animBg="1"/>
+      <p:bldP spid="37" grpId="0" animBg="1"/>
+      <p:bldP spid="39" grpId="0" animBg="1"/>
+      <p:bldP spid="40" grpId="0" animBg="1"/>
+      <p:bldP spid="42" grpId="0" animBg="1"/>
+      <p:bldP spid="43" grpId="0" animBg="1"/>
+    </p:bldLst>
+  </p:timing>
+</p:sld>
+</file>
+
+<file path=ppt/slides/slide14.xml><?xml version="1.0" encoding="utf-8"?>
+<p:sld xmlns:a="http://schemas.openxmlformats.org/drawingml/2006/main" xmlns:r="http://schemas.openxmlformats.org/officeDocument/2006/relationships" xmlns:p="http://schemas.openxmlformats.org/presentationml/2006/main">
+  <p:cSld>
+    <p:spTree>
+      <p:nvGrpSpPr>
+        <p:cNvPr id="1" name=""/>
+        <p:cNvGrpSpPr/>
+        <p:nvPr/>
+      </p:nvGrpSpPr>
+      <p:grpSpPr>
+        <a:xfrm>
+          <a:off x="0" y="0"/>
+          <a:ext cx="0" cy="0"/>
+          <a:chOff x="0" y="0"/>
+          <a:chExt cx="0" cy="0"/>
+        </a:xfrm>
+      </p:grpSpPr>
+      <p:sp>
+        <p:nvSpPr>
+          <p:cNvPr id="2" name="Title 1"/>
+          <p:cNvSpPr>
+            <a:spLocks noGrp="1"/>
+          </p:cNvSpPr>
+          <p:nvPr>
+            <p:ph type="title"/>
+          </p:nvPr>
+        </p:nvSpPr>
+        <p:spPr/>
+        <p:txBody>
+          <a:bodyPr/>
+          <a:lstStyle/>
+          <a:p>
+            <a:r>
+              <a:rPr lang="en-US" dirty="0"/>
+              <a:t>Using Batch Shipyard (aka the Tutorial)</a:t>
+            </a:r>
+          </a:p>
+        </p:txBody>
+      </p:sp>
+      <p:sp>
+        <p:nvSpPr>
+          <p:cNvPr id="3" name="Text Placeholder 2"/>
+          <p:cNvSpPr>
+            <a:spLocks noGrp="1"/>
+          </p:cNvSpPr>
+          <p:nvPr>
+            <p:ph type="body" sz="quarter" idx="10"/>
+          </p:nvPr>
+        </p:nvSpPr>
+        <p:spPr>
+          <a:xfrm>
+            <a:off x="269303" y="1187644"/>
+            <a:ext cx="11655078" cy="5386475"/>
+          </a:xfrm>
+        </p:spPr>
+        <p:txBody>
+          <a:bodyPr/>
+          <a:lstStyle/>
+          <a:p>
+            <a:pPr marL="0" indent="0">
+              <a:buNone/>
+            </a:pPr>
+            <a:r>
+              <a:rPr lang="en-US" dirty="0"/>
+              <a:t>Run the install script or pull the Docker image</a:t>
+            </a:r>
+          </a:p>
+          <a:p>
+            <a:pPr marL="0" indent="0">
+              <a:buNone/>
+            </a:pPr>
+            <a:r>
+              <a:rPr lang="en-US" dirty="0"/>
+              <a:t>Set up Batch and Storage accounts</a:t>
+            </a:r>
+          </a:p>
+          <a:p>
+            <a:pPr marL="0" indent="0">
+              <a:buNone/>
+            </a:pPr>
+            <a:r>
+              <a:rPr lang="en-US" dirty="0"/>
+              <a:t>Configure 4 JSON files</a:t>
+            </a:r>
+          </a:p>
+          <a:p>
+            <a:pPr marL="224096" lvl="1" indent="0">
+              <a:buNone/>
+            </a:pPr>
+            <a:r>
+              <a:rPr lang="en-US" dirty="0" err="1"/>
+              <a:t>credentials.json</a:t>
+            </a:r>
+            <a:endParaRPr lang="en-US" dirty="0"/>
+          </a:p>
+          <a:p>
+            <a:pPr marL="224096" lvl="1" indent="0">
+              <a:buNone/>
+            </a:pPr>
+            <a:r>
+              <a:rPr lang="en-US" dirty="0" err="1"/>
+              <a:t>config.json</a:t>
+            </a:r>
+            <a:endParaRPr lang="en-US" dirty="0"/>
+          </a:p>
+          <a:p>
+            <a:pPr marL="224096" lvl="1" indent="0">
+              <a:buNone/>
+            </a:pPr>
+            <a:r>
+              <a:rPr lang="en-US" dirty="0" err="1"/>
+              <a:t>pool.json</a:t>
+            </a:r>
+            <a:endParaRPr lang="en-US" dirty="0"/>
+          </a:p>
+          <a:p>
+            <a:pPr marL="224096" lvl="1" indent="0">
+              <a:buNone/>
+            </a:pPr>
+            <a:r>
+              <a:rPr lang="en-US" dirty="0" err="1"/>
+              <a:t>jobs.json</a:t>
+            </a:r>
+            <a:endParaRPr lang="en-US" dirty="0"/>
+          </a:p>
+          <a:p>
+            <a:pPr marL="0" indent="0">
+              <a:buNone/>
+            </a:pPr>
+            <a:r>
+              <a:rPr lang="en-US" dirty="0"/>
+              <a:t>Python command line</a:t>
+            </a:r>
+          </a:p>
+          <a:p>
+            <a:pPr marL="224096" lvl="1" indent="0">
+              <a:buNone/>
+            </a:pPr>
+            <a:r>
+              <a:rPr lang="en-US" dirty="0"/>
+              <a:t>pool add, jobs add</a:t>
+            </a:r>
+          </a:p>
+          <a:p>
+            <a:pPr marL="0" indent="0">
+              <a:buNone/>
+            </a:pPr>
+            <a:r>
+              <a:rPr lang="en-US" dirty="0"/>
+              <a:t>Can start with a recipe</a:t>
+            </a:r>
+          </a:p>
+        </p:txBody>
+      </p:sp>
+    </p:spTree>
+    <p:extLst>
+      <p:ext uri="{BB962C8B-B14F-4D97-AF65-F5344CB8AC3E}">
+        <p14:creationId xmlns:p14="http://schemas.microsoft.com/office/powerpoint/2010/main" val="3951791346"/>
+      </p:ext>
+    </p:extLst>
+  </p:cSld>
+  <p:clrMapOvr>
+    <a:masterClrMapping/>
+  </p:clrMapOvr>
+  <p:transition>
+    <p:fade/>
+  </p:transition>
+</p:sld>
+</file>
+
+<file path=ppt/slides/slide15.xml><?xml version="1.0" encoding="utf-8"?>
+<p:sld xmlns:a="http://schemas.openxmlformats.org/drawingml/2006/main" xmlns:r="http://schemas.openxmlformats.org/officeDocument/2006/relationships" xmlns:p="http://schemas.openxmlformats.org/presentationml/2006/main">
+  <p:cSld>
+    <p:spTree>
+      <p:nvGrpSpPr>
+        <p:cNvPr id="1" name=""/>
+        <p:cNvGrpSpPr/>
+        <p:nvPr/>
+      </p:nvGrpSpPr>
+      <p:grpSpPr>
+        <a:xfrm>
+          <a:off x="0" y="0"/>
+          <a:ext cx="0" cy="0"/>
+          <a:chOff x="0" y="0"/>
+          <a:chExt cx="0" cy="0"/>
+        </a:xfrm>
+      </p:grpSpPr>
+      <p:sp>
+        <p:nvSpPr>
+          <p:cNvPr id="2" name="Title 1"/>
+          <p:cNvSpPr>
+            <a:spLocks noGrp="1"/>
+          </p:cNvSpPr>
+          <p:nvPr>
+            <p:ph type="title"/>
+          </p:nvPr>
+        </p:nvSpPr>
+        <p:spPr>
+          <a:xfrm>
+            <a:off x="269239" y="2084172"/>
+            <a:ext cx="11653523" cy="4094711"/>
+          </a:xfrm>
+        </p:spPr>
+        <p:txBody>
+          <a:bodyPr/>
+          <a:lstStyle/>
+          <a:p>
+            <a:r>
+              <a:rPr lang="en-US" dirty="0"/>
+              <a:t>Step 2: Single GPU Training,</a:t>
+            </a:r>
+            <a:br>
+              <a:rPr lang="en-US" dirty="0"/>
+            </a:br>
+            <a:r>
+              <a:rPr lang="en-US" dirty="0"/>
+              <a:t>Scoring, Parameter Sweep, Advanced Scenarios, and Cleanup</a:t>
+            </a:r>
+          </a:p>
+        </p:txBody>
+      </p:sp>
+    </p:spTree>
+    <p:extLst>
+      <p:ext uri="{BB962C8B-B14F-4D97-AF65-F5344CB8AC3E}">
+        <p14:creationId xmlns:p14="http://schemas.microsoft.com/office/powerpoint/2010/main" val="640656623"/>
+      </p:ext>
+    </p:extLst>
+  </p:cSld>
+  <p:clrMapOvr>
+    <a:masterClrMapping/>
+  </p:clrMapOvr>
+  <mc:AlternateContent xmlns:mc="http://schemas.openxmlformats.org/markup-compatibility/2006" xmlns:p14="http://schemas.microsoft.com/office/powerpoint/2010/main">
+    <mc:Choice Requires="p14">
+      <p:transition spd="med" p14:dur="700">
+        <p:fade/>
+      </p:transition>
+    </mc:Choice>
+    <mc:Fallback xmlns="">
+      <p:transition spd="med">
+        <p:fade/>
+      </p:transition>
+    </mc:Fallback>
+  </mc:AlternateContent>
+</p:sld>
+</file>
+
+<file path=ppt/slides/slide16.xml><?xml version="1.0" encoding="utf-8"?>
+<p:sld xmlns:a="http://schemas.openxmlformats.org/drawingml/2006/main" xmlns:r="http://schemas.openxmlformats.org/officeDocument/2006/relationships" xmlns:p="http://schemas.openxmlformats.org/presentationml/2006/main">
+  <p:cSld>
+    <p:spTree>
+      <p:nvGrpSpPr>
+        <p:cNvPr id="1" name=""/>
+        <p:cNvGrpSpPr/>
+        <p:nvPr/>
+      </p:nvGrpSpPr>
+      <p:grpSpPr>
+        <a:xfrm>
+          <a:off x="0" y="0"/>
+          <a:ext cx="0" cy="0"/>
+          <a:chOff x="0" y="0"/>
+          <a:chExt cx="0" cy="0"/>
+        </a:xfrm>
+      </p:grpSpPr>
+      <p:sp>
+        <p:nvSpPr>
+          <p:cNvPr id="2" name="Title 1"/>
+          <p:cNvSpPr>
+            <a:spLocks noGrp="1"/>
+          </p:cNvSpPr>
+          <p:nvPr>
+            <p:ph type="title"/>
+          </p:nvPr>
+        </p:nvSpPr>
+        <p:spPr>
+          <a:xfrm>
+            <a:off x="269239" y="2084172"/>
+            <a:ext cx="11653523" cy="2139688"/>
+          </a:xfrm>
+        </p:spPr>
+        <p:txBody>
+          <a:bodyPr/>
+          <a:lstStyle/>
+          <a:p>
+            <a:r>
+              <a:rPr lang="en-US" dirty="0"/>
+              <a:t>Ask Us Questions</a:t>
+            </a:r>
+            <a:br>
+              <a:rPr lang="en-US" dirty="0"/>
+            </a:br>
+            <a:r>
+              <a:rPr lang="en-US" dirty="0"/>
+              <a:t>Share Ideas and Feedback</a:t>
+            </a:r>
+          </a:p>
+        </p:txBody>
+      </p:sp>
+    </p:spTree>
+    <p:extLst>
+      <p:ext uri="{BB962C8B-B14F-4D97-AF65-F5344CB8AC3E}">
+        <p14:creationId xmlns:p14="http://schemas.microsoft.com/office/powerpoint/2010/main" val="2723767720"/>
+      </p:ext>
+    </p:extLst>
+  </p:cSld>
+  <p:clrMapOvr>
+    <a:masterClrMapping/>
+  </p:clrMapOvr>
+  <p:transition>
+    <p:fade/>
+  </p:transition>
+</p:sld>
+</file>
+
+<file path=ppt/slides/slide17.xml><?xml version="1.0" encoding="utf-8"?>
+<p:sld xmlns:a="http://schemas.openxmlformats.org/drawingml/2006/main" xmlns:r="http://schemas.openxmlformats.org/officeDocument/2006/relationships" xmlns:p="http://schemas.openxmlformats.org/presentationml/2006/main">
+  <p:cSld>
+    <p:spTree>
+      <p:nvGrpSpPr>
+        <p:cNvPr id="1" name=""/>
+        <p:cNvGrpSpPr/>
+        <p:nvPr/>
+      </p:nvGrpSpPr>
+      <p:grpSpPr>
+        <a:xfrm>
+          <a:off x="0" y="0"/>
+          <a:ext cx="0" cy="0"/>
+          <a:chOff x="0" y="0"/>
+          <a:chExt cx="0" cy="0"/>
+        </a:xfrm>
+      </p:grpSpPr>
+    </p:spTree>
+    <p:extLst>
+      <p:ext uri="{BB962C8B-B14F-4D97-AF65-F5344CB8AC3E}">
+        <p14:creationId xmlns:p14="http://schemas.microsoft.com/office/powerpoint/2010/main" val="2566430769"/>
+      </p:ext>
+    </p:extLst>
+  </p:cSld>
+  <p:clrMapOvr>
+    <a:masterClrMapping/>
+  </p:clrMapOvr>
+  <mc:AlternateContent xmlns:mc="http://schemas.openxmlformats.org/markup-compatibility/2006" xmlns:p14="http://schemas.microsoft.com/office/powerpoint/2010/main">
+    <mc:Choice Requires="p14">
+      <p:transition spd="med" p14:dur="700">
+        <p:fade/>
+      </p:transition>
+    </mc:Choice>
+    <mc:Fallback xmlns="">
+      <p:transition spd="med">
+        <p:fade/>
+      </p:transition>
+    </mc:Fallback>
+  </mc:AlternateContent>
+</p:sld>
+</file>
+
+<file path=ppt/slides/slide18.xml><?xml version="1.0" encoding="utf-8"?>
 <p:sld xmlns:a="http://schemas.openxmlformats.org/drawingml/2006/main" xmlns:r="http://schemas.openxmlformats.org/officeDocument/2006/relationships" xmlns:p="http://schemas.openxmlformats.org/presentationml/2006/main">
   <p:cSld>
     <p:spTree>
@@ -21172,361 +24898,6 @@
 </p:sld>
 </file>
 
-<file path=ppt/slides/slide14.xml><?xml version="1.0" encoding="utf-8"?>
-<p:sld xmlns:a="http://schemas.openxmlformats.org/drawingml/2006/main" xmlns:r="http://schemas.openxmlformats.org/officeDocument/2006/relationships" xmlns:p="http://schemas.openxmlformats.org/presentationml/2006/main">
-  <p:cSld>
-    <p:spTree>
-      <p:nvGrpSpPr>
-        <p:cNvPr id="1" name=""/>
-        <p:cNvGrpSpPr/>
-        <p:nvPr/>
-      </p:nvGrpSpPr>
-      <p:grpSpPr>
-        <a:xfrm>
-          <a:off x="0" y="0"/>
-          <a:ext cx="0" cy="0"/>
-          <a:chOff x="0" y="0"/>
-          <a:chExt cx="0" cy="0"/>
-        </a:xfrm>
-      </p:grpSpPr>
-      <p:sp>
-        <p:nvSpPr>
-          <p:cNvPr id="2" name="Title 1"/>
-          <p:cNvSpPr>
-            <a:spLocks noGrp="1"/>
-          </p:cNvSpPr>
-          <p:nvPr>
-            <p:ph type="title"/>
-          </p:nvPr>
-        </p:nvSpPr>
-        <p:spPr/>
-        <p:txBody>
-          <a:bodyPr/>
-          <a:lstStyle/>
-          <a:p>
-            <a:r>
-              <a:rPr lang="en-US" dirty="0"/>
-              <a:t>Using Batch Shipyard (aka the Tutorial)</a:t>
-            </a:r>
-          </a:p>
-        </p:txBody>
-      </p:sp>
-      <p:sp>
-        <p:nvSpPr>
-          <p:cNvPr id="3" name="Text Placeholder 2"/>
-          <p:cNvSpPr>
-            <a:spLocks noGrp="1"/>
-          </p:cNvSpPr>
-          <p:nvPr>
-            <p:ph type="body" sz="quarter" idx="10"/>
-          </p:nvPr>
-        </p:nvSpPr>
-        <p:spPr>
-          <a:xfrm>
-            <a:off x="269303" y="1187644"/>
-            <a:ext cx="11655078" cy="5386475"/>
-          </a:xfrm>
-        </p:spPr>
-        <p:txBody>
-          <a:bodyPr/>
-          <a:lstStyle/>
-          <a:p>
-            <a:pPr marL="0" indent="0">
-              <a:buNone/>
-            </a:pPr>
-            <a:r>
-              <a:rPr lang="en-US" dirty="0"/>
-              <a:t>Run the install script or pull the Docker image</a:t>
-            </a:r>
-          </a:p>
-          <a:p>
-            <a:pPr marL="0" indent="0">
-              <a:buNone/>
-            </a:pPr>
-            <a:r>
-              <a:rPr lang="en-US" dirty="0"/>
-              <a:t>Set up Batch and Storage accounts</a:t>
-            </a:r>
-          </a:p>
-          <a:p>
-            <a:pPr marL="0" indent="0">
-              <a:buNone/>
-            </a:pPr>
-            <a:r>
-              <a:rPr lang="en-US" dirty="0"/>
-              <a:t>Configure 4 JSON files</a:t>
-            </a:r>
-          </a:p>
-          <a:p>
-            <a:pPr marL="224096" lvl="1" indent="0">
-              <a:buNone/>
-            </a:pPr>
-            <a:r>
-              <a:rPr lang="en-US" dirty="0" err="1"/>
-              <a:t>credentials.json</a:t>
-            </a:r>
-            <a:endParaRPr lang="en-US" dirty="0"/>
-          </a:p>
-          <a:p>
-            <a:pPr marL="224096" lvl="1" indent="0">
-              <a:buNone/>
-            </a:pPr>
-            <a:r>
-              <a:rPr lang="en-US" dirty="0" err="1"/>
-              <a:t>config.json</a:t>
-            </a:r>
-            <a:endParaRPr lang="en-US" dirty="0"/>
-          </a:p>
-          <a:p>
-            <a:pPr marL="224096" lvl="1" indent="0">
-              <a:buNone/>
-            </a:pPr>
-            <a:r>
-              <a:rPr lang="en-US" dirty="0" err="1"/>
-              <a:t>pool.json</a:t>
-            </a:r>
-            <a:endParaRPr lang="en-US" dirty="0"/>
-          </a:p>
-          <a:p>
-            <a:pPr marL="224096" lvl="1" indent="0">
-              <a:buNone/>
-            </a:pPr>
-            <a:r>
-              <a:rPr lang="en-US" dirty="0" err="1"/>
-              <a:t>jobs.json</a:t>
-            </a:r>
-            <a:endParaRPr lang="en-US" dirty="0"/>
-          </a:p>
-          <a:p>
-            <a:pPr marL="0" indent="0">
-              <a:buNone/>
-            </a:pPr>
-            <a:r>
-              <a:rPr lang="en-US" dirty="0"/>
-              <a:t>Python command line</a:t>
-            </a:r>
-          </a:p>
-          <a:p>
-            <a:pPr marL="224096" lvl="1" indent="0">
-              <a:buNone/>
-            </a:pPr>
-            <a:r>
-              <a:rPr lang="en-US" dirty="0"/>
-              <a:t>pool add, jobs add</a:t>
-            </a:r>
-          </a:p>
-          <a:p>
-            <a:pPr marL="0" indent="0">
-              <a:buNone/>
-            </a:pPr>
-            <a:r>
-              <a:rPr lang="en-US" dirty="0"/>
-              <a:t>Can start with a recipe</a:t>
-            </a:r>
-          </a:p>
-        </p:txBody>
-      </p:sp>
-    </p:spTree>
-    <p:extLst>
-      <p:ext uri="{BB962C8B-B14F-4D97-AF65-F5344CB8AC3E}">
-        <p14:creationId xmlns:p14="http://schemas.microsoft.com/office/powerpoint/2010/main" val="3951791346"/>
-      </p:ext>
-    </p:extLst>
-  </p:cSld>
-  <p:clrMapOvr>
-    <a:masterClrMapping/>
-  </p:clrMapOvr>
-  <p:transition>
-    <p:fade/>
-  </p:transition>
-</p:sld>
-</file>
-
-<file path=ppt/slides/slide15.xml><?xml version="1.0" encoding="utf-8"?>
-<p:sld xmlns:a="http://schemas.openxmlformats.org/drawingml/2006/main" xmlns:r="http://schemas.openxmlformats.org/officeDocument/2006/relationships" xmlns:p="http://schemas.openxmlformats.org/presentationml/2006/main">
-  <p:cSld>
-    <p:spTree>
-      <p:nvGrpSpPr>
-        <p:cNvPr id="1" name=""/>
-        <p:cNvGrpSpPr/>
-        <p:nvPr/>
-      </p:nvGrpSpPr>
-      <p:grpSpPr>
-        <a:xfrm>
-          <a:off x="0" y="0"/>
-          <a:ext cx="0" cy="0"/>
-          <a:chOff x="0" y="0"/>
-          <a:chExt cx="0" cy="0"/>
-        </a:xfrm>
-      </p:grpSpPr>
-      <p:sp>
-        <p:nvSpPr>
-          <p:cNvPr id="2" name="Title 1"/>
-          <p:cNvSpPr>
-            <a:spLocks noGrp="1"/>
-          </p:cNvSpPr>
-          <p:nvPr>
-            <p:ph type="title"/>
-          </p:nvPr>
-        </p:nvSpPr>
-        <p:spPr>
-          <a:xfrm>
-            <a:off x="269239" y="2084172"/>
-            <a:ext cx="11653523" cy="4094711"/>
-          </a:xfrm>
-        </p:spPr>
-        <p:txBody>
-          <a:bodyPr/>
-          <a:lstStyle/>
-          <a:p>
-            <a:r>
-              <a:rPr lang="en-US" dirty="0"/>
-              <a:t>Step 2: Single GPU Training,</a:t>
-            </a:r>
-            <a:br>
-              <a:rPr lang="en-US" dirty="0"/>
-            </a:br>
-            <a:r>
-              <a:rPr lang="en-US" dirty="0"/>
-              <a:t>Scoring, Parameter Sweep, Advanced Scenarios, and Cleanup</a:t>
-            </a:r>
-          </a:p>
-        </p:txBody>
-      </p:sp>
-    </p:spTree>
-    <p:extLst>
-      <p:ext uri="{BB962C8B-B14F-4D97-AF65-F5344CB8AC3E}">
-        <p14:creationId xmlns:p14="http://schemas.microsoft.com/office/powerpoint/2010/main" val="640656623"/>
-      </p:ext>
-    </p:extLst>
-  </p:cSld>
-  <p:clrMapOvr>
-    <a:masterClrMapping/>
-  </p:clrMapOvr>
-  <mc:AlternateContent xmlns:mc="http://schemas.openxmlformats.org/markup-compatibility/2006" xmlns:p14="http://schemas.microsoft.com/office/powerpoint/2010/main">
-    <mc:Choice Requires="p14">
-      <p:transition spd="med" p14:dur="700">
-        <p:fade/>
-      </p:transition>
-    </mc:Choice>
-    <mc:Fallback xmlns="">
-      <p:transition spd="med">
-        <p:fade/>
-      </p:transition>
-    </mc:Fallback>
-  </mc:AlternateContent>
-</p:sld>
-</file>
-
-<file path=ppt/slides/slide16.xml><?xml version="1.0" encoding="utf-8"?>
-<p:sld xmlns:a="http://schemas.openxmlformats.org/drawingml/2006/main" xmlns:r="http://schemas.openxmlformats.org/officeDocument/2006/relationships" xmlns:p="http://schemas.openxmlformats.org/presentationml/2006/main">
-  <p:cSld>
-    <p:spTree>
-      <p:nvGrpSpPr>
-        <p:cNvPr id="1" name=""/>
-        <p:cNvGrpSpPr/>
-        <p:nvPr/>
-      </p:nvGrpSpPr>
-      <p:grpSpPr>
-        <a:xfrm>
-          <a:off x="0" y="0"/>
-          <a:ext cx="0" cy="0"/>
-          <a:chOff x="0" y="0"/>
-          <a:chExt cx="0" cy="0"/>
-        </a:xfrm>
-      </p:grpSpPr>
-      <p:sp>
-        <p:nvSpPr>
-          <p:cNvPr id="2" name="Title 1"/>
-          <p:cNvSpPr>
-            <a:spLocks noGrp="1"/>
-          </p:cNvSpPr>
-          <p:nvPr>
-            <p:ph type="title"/>
-          </p:nvPr>
-        </p:nvSpPr>
-        <p:spPr>
-          <a:xfrm>
-            <a:off x="269239" y="2084172"/>
-            <a:ext cx="11653523" cy="2139688"/>
-          </a:xfrm>
-        </p:spPr>
-        <p:txBody>
-          <a:bodyPr/>
-          <a:lstStyle/>
-          <a:p>
-            <a:r>
-              <a:rPr lang="en-US" dirty="0"/>
-              <a:t>Ask Us Questions</a:t>
-            </a:r>
-            <a:br>
-              <a:rPr lang="en-US" dirty="0"/>
-            </a:br>
-            <a:r>
-              <a:rPr lang="en-US" dirty="0"/>
-              <a:t>Share Ideas and Feedback</a:t>
-            </a:r>
-          </a:p>
-        </p:txBody>
-      </p:sp>
-    </p:spTree>
-    <p:extLst>
-      <p:ext uri="{BB962C8B-B14F-4D97-AF65-F5344CB8AC3E}">
-        <p14:creationId xmlns:p14="http://schemas.microsoft.com/office/powerpoint/2010/main" val="2723767720"/>
-      </p:ext>
-    </p:extLst>
-  </p:cSld>
-  <p:clrMapOvr>
-    <a:masterClrMapping/>
-  </p:clrMapOvr>
-  <p:transition>
-    <p:fade/>
-  </p:transition>
-</p:sld>
-</file>
-
-<file path=ppt/slides/slide17.xml><?xml version="1.0" encoding="utf-8"?>
-<p:sld xmlns:a="http://schemas.openxmlformats.org/drawingml/2006/main" xmlns:r="http://schemas.openxmlformats.org/officeDocument/2006/relationships" xmlns:p="http://schemas.openxmlformats.org/presentationml/2006/main">
-  <p:cSld>
-    <p:spTree>
-      <p:nvGrpSpPr>
-        <p:cNvPr id="1" name=""/>
-        <p:cNvGrpSpPr/>
-        <p:nvPr/>
-      </p:nvGrpSpPr>
-      <p:grpSpPr>
-        <a:xfrm>
-          <a:off x="0" y="0"/>
-          <a:ext cx="0" cy="0"/>
-          <a:chOff x="0" y="0"/>
-          <a:chExt cx="0" cy="0"/>
-        </a:xfrm>
-      </p:grpSpPr>
-    </p:spTree>
-    <p:extLst>
-      <p:ext uri="{BB962C8B-B14F-4D97-AF65-F5344CB8AC3E}">
-        <p14:creationId xmlns:p14="http://schemas.microsoft.com/office/powerpoint/2010/main" val="2566430769"/>
-      </p:ext>
-    </p:extLst>
-  </p:cSld>
-  <p:clrMapOvr>
-    <a:masterClrMapping/>
-  </p:clrMapOvr>
-  <mc:AlternateContent xmlns:mc="http://schemas.openxmlformats.org/markup-compatibility/2006" xmlns:p14="http://schemas.microsoft.com/office/powerpoint/2010/main">
-    <mc:Choice Requires="p14">
-      <p:transition spd="med" p14:dur="700">
-        <p:fade/>
-      </p:transition>
-    </mc:Choice>
-    <mc:Fallback xmlns="">
-      <p:transition spd="med">
-        <p:fade/>
-      </p:transition>
-    </mc:Fallback>
-  </mc:AlternateContent>
-</p:sld>
-</file>
-
 <file path=ppt/slides/slide2.xml><?xml version="1.0" encoding="utf-8"?>
 <p:sld xmlns:a="http://schemas.openxmlformats.org/drawingml/2006/main" xmlns:r="http://schemas.openxmlformats.org/officeDocument/2006/relationships" xmlns:p="http://schemas.openxmlformats.org/presentationml/2006/main">
   <p:cSld>
@@ -21692,7 +25063,7 @@
         <p:spPr>
           <a:xfrm>
             <a:off x="269303" y="1187962"/>
-            <a:ext cx="11655078" cy="3443250"/>
+            <a:ext cx="11655078" cy="4420826"/>
           </a:xfrm>
         </p:spPr>
         <p:txBody>
@@ -21701,19 +25072,19 @@
           <a:p>
             <a:r>
               <a:rPr lang="en-US" dirty="0"/>
-              <a:t>Learn Azure Batch concepts applied for AI workflows</a:t>
+              <a:t>Learn Azure Batch concepts as applied to deep learning workflows</a:t>
             </a:r>
           </a:p>
           <a:p>
             <a:r>
               <a:rPr lang="en-US" dirty="0"/>
-              <a:t>Use Azure Batch to train and score AI models on a GPU cluster with Batch Shipyard and example Notebooks</a:t>
+              <a:t>Use Azure Batch to train and score deep learning models on a GPU cluster with Batch Shipyard and example Notebooks</a:t>
             </a:r>
           </a:p>
           <a:p>
             <a:r>
               <a:rPr lang="en-US" dirty="0"/>
-              <a:t>See examples of Batch Shipyard with different scenarios, deep learning frameworks, containers, and topologies</a:t>
+              <a:t>See examples of Batch Shipyard with different scenarios, deep learning frameworks, and node configurations</a:t>
             </a:r>
           </a:p>
           <a:p>

</xml_diff>